<commit_message>
add hybrid model result
</commit_message>
<xml_diff>
--- a/Household_power_prediction.pptx
+++ b/Household_power_prediction.pptx
@@ -7,11 +7,25 @@
   <p:sldIdLst>
     <p:sldId id="256" r:id="rId2"/>
     <p:sldId id="257" r:id="rId3"/>
-    <p:sldId id="258" r:id="rId4"/>
-    <p:sldId id="262" r:id="rId5"/>
-    <p:sldId id="261" r:id="rId6"/>
-    <p:sldId id="259" r:id="rId7"/>
-    <p:sldId id="260" r:id="rId8"/>
+    <p:sldId id="263" r:id="rId4"/>
+    <p:sldId id="269" r:id="rId5"/>
+    <p:sldId id="258" r:id="rId6"/>
+    <p:sldId id="262" r:id="rId7"/>
+    <p:sldId id="261" r:id="rId8"/>
+    <p:sldId id="259" r:id="rId9"/>
+    <p:sldId id="260" r:id="rId10"/>
+    <p:sldId id="267" r:id="rId11"/>
+    <p:sldId id="264" r:id="rId12"/>
+    <p:sldId id="268" r:id="rId13"/>
+    <p:sldId id="266" r:id="rId14"/>
+    <p:sldId id="265" r:id="rId15"/>
+    <p:sldId id="270" r:id="rId16"/>
+    <p:sldId id="271" r:id="rId17"/>
+    <p:sldId id="273" r:id="rId18"/>
+    <p:sldId id="272" r:id="rId19"/>
+    <p:sldId id="274" r:id="rId20"/>
+    <p:sldId id="275" r:id="rId21"/>
+    <p:sldId id="276" r:id="rId22"/>
   </p:sldIdLst>
   <p:sldSz cx="12192000" cy="6858000"/>
   <p:notesSz cx="6858000" cy="9144000"/>
@@ -265,7 +279,7 @@
           <a:p>
             <a:fld id="{4547CBA7-2F5E-406A-A1EB-B7C31CF517B7}" type="datetimeFigureOut">
               <a:rPr lang="zh-TW" altLang="en-US" smtClean="0"/>
-              <a:t>2021/4/22</a:t>
+              <a:t>2021/4/24</a:t>
             </a:fld>
             <a:endParaRPr lang="zh-TW" altLang="en-US"/>
           </a:p>
@@ -463,7 +477,7 @@
           <a:p>
             <a:fld id="{4547CBA7-2F5E-406A-A1EB-B7C31CF517B7}" type="datetimeFigureOut">
               <a:rPr lang="zh-TW" altLang="en-US" smtClean="0"/>
-              <a:t>2021/4/22</a:t>
+              <a:t>2021/4/24</a:t>
             </a:fld>
             <a:endParaRPr lang="zh-TW" altLang="en-US"/>
           </a:p>
@@ -671,7 +685,7 @@
           <a:p>
             <a:fld id="{4547CBA7-2F5E-406A-A1EB-B7C31CF517B7}" type="datetimeFigureOut">
               <a:rPr lang="zh-TW" altLang="en-US" smtClean="0"/>
-              <a:t>2021/4/22</a:t>
+              <a:t>2021/4/24</a:t>
             </a:fld>
             <a:endParaRPr lang="zh-TW" altLang="en-US"/>
           </a:p>
@@ -879,7 +893,7 @@
           <a:p>
             <a:fld id="{4547CBA7-2F5E-406A-A1EB-B7C31CF517B7}" type="datetimeFigureOut">
               <a:rPr lang="zh-TW" altLang="en-US" smtClean="0"/>
-              <a:t>2021/4/22</a:t>
+              <a:t>2021/4/24</a:t>
             </a:fld>
             <a:endParaRPr lang="zh-TW" altLang="en-US"/>
           </a:p>
@@ -1154,7 +1168,7 @@
           <a:p>
             <a:fld id="{4547CBA7-2F5E-406A-A1EB-B7C31CF517B7}" type="datetimeFigureOut">
               <a:rPr lang="zh-TW" altLang="en-US" smtClean="0"/>
-              <a:t>2021/4/22</a:t>
+              <a:t>2021/4/24</a:t>
             </a:fld>
             <a:endParaRPr lang="zh-TW" altLang="en-US"/>
           </a:p>
@@ -1419,7 +1433,7 @@
           <a:p>
             <a:fld id="{4547CBA7-2F5E-406A-A1EB-B7C31CF517B7}" type="datetimeFigureOut">
               <a:rPr lang="zh-TW" altLang="en-US" smtClean="0"/>
-              <a:t>2021/4/22</a:t>
+              <a:t>2021/4/24</a:t>
             </a:fld>
             <a:endParaRPr lang="zh-TW" altLang="en-US"/>
           </a:p>
@@ -1831,7 +1845,7 @@
           <a:p>
             <a:fld id="{4547CBA7-2F5E-406A-A1EB-B7C31CF517B7}" type="datetimeFigureOut">
               <a:rPr lang="zh-TW" altLang="en-US" smtClean="0"/>
-              <a:t>2021/4/22</a:t>
+              <a:t>2021/4/24</a:t>
             </a:fld>
             <a:endParaRPr lang="zh-TW" altLang="en-US"/>
           </a:p>
@@ -1972,7 +1986,7 @@
           <a:p>
             <a:fld id="{4547CBA7-2F5E-406A-A1EB-B7C31CF517B7}" type="datetimeFigureOut">
               <a:rPr lang="zh-TW" altLang="en-US" smtClean="0"/>
-              <a:t>2021/4/22</a:t>
+              <a:t>2021/4/24</a:t>
             </a:fld>
             <a:endParaRPr lang="zh-TW" altLang="en-US"/>
           </a:p>
@@ -2085,7 +2099,7 @@
           <a:p>
             <a:fld id="{4547CBA7-2F5E-406A-A1EB-B7C31CF517B7}" type="datetimeFigureOut">
               <a:rPr lang="zh-TW" altLang="en-US" smtClean="0"/>
-              <a:t>2021/4/22</a:t>
+              <a:t>2021/4/24</a:t>
             </a:fld>
             <a:endParaRPr lang="zh-TW" altLang="en-US"/>
           </a:p>
@@ -2396,7 +2410,7 @@
           <a:p>
             <a:fld id="{4547CBA7-2F5E-406A-A1EB-B7C31CF517B7}" type="datetimeFigureOut">
               <a:rPr lang="zh-TW" altLang="en-US" smtClean="0"/>
-              <a:t>2021/4/22</a:t>
+              <a:t>2021/4/24</a:t>
             </a:fld>
             <a:endParaRPr lang="zh-TW" altLang="en-US"/>
           </a:p>
@@ -2687,7 +2701,7 @@
           <a:p>
             <a:fld id="{4547CBA7-2F5E-406A-A1EB-B7C31CF517B7}" type="datetimeFigureOut">
               <a:rPr lang="zh-TW" altLang="en-US" smtClean="0"/>
-              <a:t>2021/4/22</a:t>
+              <a:t>2021/4/24</a:t>
             </a:fld>
             <a:endParaRPr lang="zh-TW" altLang="en-US"/>
           </a:p>
@@ -2930,7 +2944,7 @@
           <a:p>
             <a:fld id="{4547CBA7-2F5E-406A-A1EB-B7C31CF517B7}" type="datetimeFigureOut">
               <a:rPr lang="zh-TW" altLang="en-US" smtClean="0"/>
-              <a:t>2021/4/22</a:t>
+              <a:t>2021/4/24</a:t>
             </a:fld>
             <a:endParaRPr lang="zh-TW" altLang="en-US"/>
           </a:p>
@@ -3426,6 +3440,1717 @@
 </p:sld>
 </file>
 
+<file path=ppt/slides/slide10.xml><?xml version="1.0" encoding="utf-8"?>
+<p:sld xmlns:a="http://schemas.openxmlformats.org/drawingml/2006/main" xmlns:r="http://schemas.openxmlformats.org/officeDocument/2006/relationships" xmlns:p="http://schemas.openxmlformats.org/presentationml/2006/main">
+  <p:cSld>
+    <p:spTree>
+      <p:nvGrpSpPr>
+        <p:cNvPr id="1" name=""/>
+        <p:cNvGrpSpPr/>
+        <p:nvPr/>
+      </p:nvGrpSpPr>
+      <p:grpSpPr>
+        <a:xfrm>
+          <a:off x="0" y="0"/>
+          <a:ext cx="0" cy="0"/>
+          <a:chOff x="0" y="0"/>
+          <a:chExt cx="0" cy="0"/>
+        </a:xfrm>
+      </p:grpSpPr>
+      <p:sp>
+        <p:nvSpPr>
+          <p:cNvPr id="4" name="矩形 3">
+            <a:extLst>
+              <a:ext uri="{FF2B5EF4-FFF2-40B4-BE49-F238E27FC236}">
+                <a16:creationId xmlns:a16="http://schemas.microsoft.com/office/drawing/2014/main" id="{814FBB10-DD53-4B9C-845D-BE9F79FEF4D6}"/>
+              </a:ext>
+            </a:extLst>
+          </p:cNvPr>
+          <p:cNvSpPr/>
+          <p:nvPr/>
+        </p:nvSpPr>
+        <p:spPr>
+          <a:xfrm>
+            <a:off x="1856934" y="1083213"/>
+            <a:ext cx="2335238" cy="1266092"/>
+          </a:xfrm>
+          <a:prstGeom prst="rect">
+            <a:avLst/>
+          </a:prstGeom>
+          <a:noFill/>
+          <a:ln w="57150">
+            <a:solidFill>
+              <a:schemeClr val="tx1"/>
+            </a:solidFill>
+          </a:ln>
+        </p:spPr>
+        <p:style>
+          <a:lnRef idx="2">
+            <a:schemeClr val="accent1">
+              <a:shade val="50000"/>
+            </a:schemeClr>
+          </a:lnRef>
+          <a:fillRef idx="1">
+            <a:schemeClr val="accent1"/>
+          </a:fillRef>
+          <a:effectRef idx="0">
+            <a:schemeClr val="accent1"/>
+          </a:effectRef>
+          <a:fontRef idx="minor">
+            <a:schemeClr val="lt1"/>
+          </a:fontRef>
+        </p:style>
+        <p:txBody>
+          <a:bodyPr rtlCol="0" anchor="ctr"/>
+          <a:lstStyle/>
+          <a:p>
+            <a:pPr algn="ctr"/>
+            <a:endParaRPr lang="zh-TW" altLang="en-US"/>
+          </a:p>
+        </p:txBody>
+      </p:sp>
+      <p:sp>
+        <p:nvSpPr>
+          <p:cNvPr id="5" name="矩形 4">
+            <a:extLst>
+              <a:ext uri="{FF2B5EF4-FFF2-40B4-BE49-F238E27FC236}">
+                <a16:creationId xmlns:a16="http://schemas.microsoft.com/office/drawing/2014/main" id="{32E5EF09-67C4-4F8F-8B6C-64AAFC7CA0D2}"/>
+              </a:ext>
+            </a:extLst>
+          </p:cNvPr>
+          <p:cNvSpPr/>
+          <p:nvPr/>
+        </p:nvSpPr>
+        <p:spPr>
+          <a:xfrm>
+            <a:off x="6832211" y="1083213"/>
+            <a:ext cx="2335238" cy="1266092"/>
+          </a:xfrm>
+          <a:prstGeom prst="rect">
+            <a:avLst/>
+          </a:prstGeom>
+          <a:noFill/>
+          <a:ln w="57150">
+            <a:solidFill>
+              <a:schemeClr val="tx1"/>
+            </a:solidFill>
+          </a:ln>
+        </p:spPr>
+        <p:style>
+          <a:lnRef idx="2">
+            <a:schemeClr val="accent1">
+              <a:shade val="50000"/>
+            </a:schemeClr>
+          </a:lnRef>
+          <a:fillRef idx="1">
+            <a:schemeClr val="accent1"/>
+          </a:fillRef>
+          <a:effectRef idx="0">
+            <a:schemeClr val="accent1"/>
+          </a:effectRef>
+          <a:fontRef idx="minor">
+            <a:schemeClr val="lt1"/>
+          </a:fontRef>
+        </p:style>
+        <p:txBody>
+          <a:bodyPr rtlCol="0" anchor="ctr"/>
+          <a:lstStyle/>
+          <a:p>
+            <a:pPr algn="ctr"/>
+            <a:endParaRPr lang="zh-TW" altLang="en-US"/>
+          </a:p>
+        </p:txBody>
+      </p:sp>
+      <p:sp>
+        <p:nvSpPr>
+          <p:cNvPr id="6" name="矩形 5">
+            <a:extLst>
+              <a:ext uri="{FF2B5EF4-FFF2-40B4-BE49-F238E27FC236}">
+                <a16:creationId xmlns:a16="http://schemas.microsoft.com/office/drawing/2014/main" id="{59C7569A-1861-4DA6-BACB-EB23F2A88D65}"/>
+              </a:ext>
+            </a:extLst>
+          </p:cNvPr>
+          <p:cNvSpPr/>
+          <p:nvPr/>
+        </p:nvSpPr>
+        <p:spPr>
+          <a:xfrm>
+            <a:off x="4440699" y="2926081"/>
+            <a:ext cx="2335238" cy="1266092"/>
+          </a:xfrm>
+          <a:prstGeom prst="rect">
+            <a:avLst/>
+          </a:prstGeom>
+          <a:noFill/>
+          <a:ln w="57150">
+            <a:solidFill>
+              <a:schemeClr val="tx1"/>
+            </a:solidFill>
+          </a:ln>
+        </p:spPr>
+        <p:style>
+          <a:lnRef idx="2">
+            <a:schemeClr val="accent1">
+              <a:shade val="50000"/>
+            </a:schemeClr>
+          </a:lnRef>
+          <a:fillRef idx="1">
+            <a:schemeClr val="accent1"/>
+          </a:fillRef>
+          <a:effectRef idx="0">
+            <a:schemeClr val="accent1"/>
+          </a:effectRef>
+          <a:fontRef idx="minor">
+            <a:schemeClr val="lt1"/>
+          </a:fontRef>
+        </p:style>
+        <p:txBody>
+          <a:bodyPr rtlCol="0" anchor="ctr"/>
+          <a:lstStyle/>
+          <a:p>
+            <a:pPr algn="ctr"/>
+            <a:endParaRPr lang="zh-TW" altLang="en-US"/>
+          </a:p>
+        </p:txBody>
+      </p:sp>
+      <p:sp>
+        <p:nvSpPr>
+          <p:cNvPr id="7" name="矩形 6">
+            <a:extLst>
+              <a:ext uri="{FF2B5EF4-FFF2-40B4-BE49-F238E27FC236}">
+                <a16:creationId xmlns:a16="http://schemas.microsoft.com/office/drawing/2014/main" id="{73D89E32-48E1-4EA7-9CAC-4966ABC8F195}"/>
+              </a:ext>
+            </a:extLst>
+          </p:cNvPr>
+          <p:cNvSpPr/>
+          <p:nvPr/>
+        </p:nvSpPr>
+        <p:spPr>
+          <a:xfrm>
+            <a:off x="4440699" y="4794739"/>
+            <a:ext cx="2335238" cy="1266092"/>
+          </a:xfrm>
+          <a:prstGeom prst="rect">
+            <a:avLst/>
+          </a:prstGeom>
+          <a:noFill/>
+          <a:ln w="57150">
+            <a:solidFill>
+              <a:schemeClr val="tx1"/>
+            </a:solidFill>
+          </a:ln>
+        </p:spPr>
+        <p:style>
+          <a:lnRef idx="2">
+            <a:schemeClr val="accent1">
+              <a:shade val="50000"/>
+            </a:schemeClr>
+          </a:lnRef>
+          <a:fillRef idx="1">
+            <a:schemeClr val="accent1"/>
+          </a:fillRef>
+          <a:effectRef idx="0">
+            <a:schemeClr val="accent1"/>
+          </a:effectRef>
+          <a:fontRef idx="minor">
+            <a:schemeClr val="lt1"/>
+          </a:fontRef>
+        </p:style>
+        <p:txBody>
+          <a:bodyPr rtlCol="0" anchor="ctr"/>
+          <a:lstStyle/>
+          <a:p>
+            <a:pPr algn="ctr"/>
+            <a:endParaRPr lang="zh-TW" altLang="en-US"/>
+          </a:p>
+        </p:txBody>
+      </p:sp>
+      <p:sp>
+        <p:nvSpPr>
+          <p:cNvPr id="8" name="文字方塊 7">
+            <a:extLst>
+              <a:ext uri="{FF2B5EF4-FFF2-40B4-BE49-F238E27FC236}">
+                <a16:creationId xmlns:a16="http://schemas.microsoft.com/office/drawing/2014/main" id="{7B766B31-A751-4B78-97D3-6FD26DC32585}"/>
+              </a:ext>
+            </a:extLst>
+          </p:cNvPr>
+          <p:cNvSpPr txBox="1"/>
+          <p:nvPr/>
+        </p:nvSpPr>
+        <p:spPr>
+          <a:xfrm>
+            <a:off x="1983541" y="1393093"/>
+            <a:ext cx="2082019" cy="646331"/>
+          </a:xfrm>
+          <a:prstGeom prst="rect">
+            <a:avLst/>
+          </a:prstGeom>
+          <a:noFill/>
+        </p:spPr>
+        <p:txBody>
+          <a:bodyPr wrap="square" rtlCol="0" anchor="ctr">
+            <a:spAutoFit/>
+          </a:bodyPr>
+          <a:lstStyle/>
+          <a:p>
+            <a:pPr algn="ctr"/>
+            <a:r>
+              <a:rPr lang="en-US" altLang="zh-TW" sz="3600" dirty="0"/>
+              <a:t>LSTM</a:t>
+            </a:r>
+            <a:endParaRPr lang="zh-TW" altLang="en-US" sz="3600" dirty="0"/>
+          </a:p>
+        </p:txBody>
+      </p:sp>
+      <p:sp>
+        <p:nvSpPr>
+          <p:cNvPr id="9" name="文字方塊 8">
+            <a:extLst>
+              <a:ext uri="{FF2B5EF4-FFF2-40B4-BE49-F238E27FC236}">
+                <a16:creationId xmlns:a16="http://schemas.microsoft.com/office/drawing/2014/main" id="{1993E5D3-893C-4D4E-9977-5D59E7613F8F}"/>
+              </a:ext>
+            </a:extLst>
+          </p:cNvPr>
+          <p:cNvSpPr txBox="1"/>
+          <p:nvPr/>
+        </p:nvSpPr>
+        <p:spPr>
+          <a:xfrm>
+            <a:off x="6958820" y="1393093"/>
+            <a:ext cx="2082019" cy="646331"/>
+          </a:xfrm>
+          <a:prstGeom prst="rect">
+            <a:avLst/>
+          </a:prstGeom>
+          <a:noFill/>
+        </p:spPr>
+        <p:txBody>
+          <a:bodyPr wrap="square" rtlCol="0" anchor="ctr">
+            <a:spAutoFit/>
+          </a:bodyPr>
+          <a:lstStyle/>
+          <a:p>
+            <a:pPr algn="ctr"/>
+            <a:r>
+              <a:rPr lang="en-US" altLang="zh-TW" sz="3600" dirty="0"/>
+              <a:t>ARIMA</a:t>
+            </a:r>
+            <a:endParaRPr lang="zh-TW" altLang="en-US" sz="3600" dirty="0"/>
+          </a:p>
+        </p:txBody>
+      </p:sp>
+      <p:sp>
+        <p:nvSpPr>
+          <p:cNvPr id="10" name="文字方塊 9">
+            <a:extLst>
+              <a:ext uri="{FF2B5EF4-FFF2-40B4-BE49-F238E27FC236}">
+                <a16:creationId xmlns:a16="http://schemas.microsoft.com/office/drawing/2014/main" id="{A6A60A2B-004C-44A9-AB69-9298129F5ECA}"/>
+              </a:ext>
+            </a:extLst>
+          </p:cNvPr>
+          <p:cNvSpPr txBox="1"/>
+          <p:nvPr/>
+        </p:nvSpPr>
+        <p:spPr>
+          <a:xfrm>
+            <a:off x="4567308" y="3235961"/>
+            <a:ext cx="2082019" cy="646331"/>
+          </a:xfrm>
+          <a:prstGeom prst="rect">
+            <a:avLst/>
+          </a:prstGeom>
+          <a:noFill/>
+        </p:spPr>
+        <p:txBody>
+          <a:bodyPr wrap="square" rtlCol="0" anchor="ctr">
+            <a:spAutoFit/>
+          </a:bodyPr>
+          <a:lstStyle/>
+          <a:p>
+            <a:pPr algn="ctr"/>
+            <a:r>
+              <a:rPr lang="en-US" altLang="zh-TW" sz="3600" dirty="0"/>
+              <a:t>ADD</a:t>
+            </a:r>
+            <a:endParaRPr lang="zh-TW" altLang="en-US" sz="3600" dirty="0"/>
+          </a:p>
+        </p:txBody>
+      </p:sp>
+      <p:sp>
+        <p:nvSpPr>
+          <p:cNvPr id="11" name="文字方塊 10">
+            <a:extLst>
+              <a:ext uri="{FF2B5EF4-FFF2-40B4-BE49-F238E27FC236}">
+                <a16:creationId xmlns:a16="http://schemas.microsoft.com/office/drawing/2014/main" id="{7973FCAA-8901-43F5-930A-04F049184343}"/>
+              </a:ext>
+            </a:extLst>
+          </p:cNvPr>
+          <p:cNvSpPr txBox="1"/>
+          <p:nvPr/>
+        </p:nvSpPr>
+        <p:spPr>
+          <a:xfrm>
+            <a:off x="4567307" y="5104619"/>
+            <a:ext cx="2082019" cy="646331"/>
+          </a:xfrm>
+          <a:prstGeom prst="rect">
+            <a:avLst/>
+          </a:prstGeom>
+          <a:noFill/>
+        </p:spPr>
+        <p:txBody>
+          <a:bodyPr wrap="square" rtlCol="0" anchor="ctr">
+            <a:spAutoFit/>
+          </a:bodyPr>
+          <a:lstStyle/>
+          <a:p>
+            <a:pPr algn="ctr"/>
+            <a:r>
+              <a:rPr lang="en-US" altLang="zh-TW" sz="3600" dirty="0"/>
+              <a:t>Result</a:t>
+            </a:r>
+            <a:endParaRPr lang="zh-TW" altLang="en-US" sz="3600" dirty="0"/>
+          </a:p>
+        </p:txBody>
+      </p:sp>
+      <p:cxnSp>
+        <p:nvCxnSpPr>
+          <p:cNvPr id="13" name="直線單箭頭接點 12">
+            <a:extLst>
+              <a:ext uri="{FF2B5EF4-FFF2-40B4-BE49-F238E27FC236}">
+                <a16:creationId xmlns:a16="http://schemas.microsoft.com/office/drawing/2014/main" id="{E4E323ED-341C-411A-9F79-D614E66E7850}"/>
+              </a:ext>
+            </a:extLst>
+          </p:cNvPr>
+          <p:cNvCxnSpPr>
+            <a:stCxn id="4" idx="2"/>
+            <a:endCxn id="6" idx="1"/>
+          </p:cNvCxnSpPr>
+          <p:nvPr/>
+        </p:nvCxnSpPr>
+        <p:spPr>
+          <a:xfrm>
+            <a:off x="3024553" y="2349305"/>
+            <a:ext cx="1416146" cy="1209822"/>
+          </a:xfrm>
+          <a:prstGeom prst="straightConnector1">
+            <a:avLst/>
+          </a:prstGeom>
+          <a:ln w="57150">
+            <a:solidFill>
+              <a:schemeClr val="tx1"/>
+            </a:solidFill>
+            <a:tailEnd type="triangle"/>
+          </a:ln>
+        </p:spPr>
+        <p:style>
+          <a:lnRef idx="1">
+            <a:schemeClr val="accent1"/>
+          </a:lnRef>
+          <a:fillRef idx="0">
+            <a:schemeClr val="accent1"/>
+          </a:fillRef>
+          <a:effectRef idx="0">
+            <a:schemeClr val="accent1"/>
+          </a:effectRef>
+          <a:fontRef idx="minor">
+            <a:schemeClr val="tx1"/>
+          </a:fontRef>
+        </p:style>
+      </p:cxnSp>
+      <p:cxnSp>
+        <p:nvCxnSpPr>
+          <p:cNvPr id="15" name="直線單箭頭接點 14">
+            <a:extLst>
+              <a:ext uri="{FF2B5EF4-FFF2-40B4-BE49-F238E27FC236}">
+                <a16:creationId xmlns:a16="http://schemas.microsoft.com/office/drawing/2014/main" id="{671029F7-CDD5-4711-92D8-1384DBAC1E90}"/>
+              </a:ext>
+            </a:extLst>
+          </p:cNvPr>
+          <p:cNvCxnSpPr>
+            <a:cxnSpLocks/>
+            <a:stCxn id="5" idx="2"/>
+            <a:endCxn id="6" idx="3"/>
+          </p:cNvCxnSpPr>
+          <p:nvPr/>
+        </p:nvCxnSpPr>
+        <p:spPr>
+          <a:xfrm flipH="1">
+            <a:off x="6775937" y="2349305"/>
+            <a:ext cx="1223893" cy="1209822"/>
+          </a:xfrm>
+          <a:prstGeom prst="straightConnector1">
+            <a:avLst/>
+          </a:prstGeom>
+          <a:ln w="57150">
+            <a:solidFill>
+              <a:schemeClr val="tx1"/>
+            </a:solidFill>
+            <a:tailEnd type="triangle"/>
+          </a:ln>
+        </p:spPr>
+        <p:style>
+          <a:lnRef idx="1">
+            <a:schemeClr val="accent1"/>
+          </a:lnRef>
+          <a:fillRef idx="0">
+            <a:schemeClr val="accent1"/>
+          </a:fillRef>
+          <a:effectRef idx="0">
+            <a:schemeClr val="accent1"/>
+          </a:effectRef>
+          <a:fontRef idx="minor">
+            <a:schemeClr val="tx1"/>
+          </a:fontRef>
+        </p:style>
+      </p:cxnSp>
+      <p:cxnSp>
+        <p:nvCxnSpPr>
+          <p:cNvPr id="18" name="直線單箭頭接點 17">
+            <a:extLst>
+              <a:ext uri="{FF2B5EF4-FFF2-40B4-BE49-F238E27FC236}">
+                <a16:creationId xmlns:a16="http://schemas.microsoft.com/office/drawing/2014/main" id="{8F39ED48-77DB-462D-A8D8-4AEE3AAD9C91}"/>
+              </a:ext>
+            </a:extLst>
+          </p:cNvPr>
+          <p:cNvCxnSpPr>
+            <a:cxnSpLocks/>
+            <a:stCxn id="6" idx="2"/>
+            <a:endCxn id="7" idx="0"/>
+          </p:cNvCxnSpPr>
+          <p:nvPr/>
+        </p:nvCxnSpPr>
+        <p:spPr>
+          <a:xfrm>
+            <a:off x="5608318" y="4192173"/>
+            <a:ext cx="0" cy="602566"/>
+          </a:xfrm>
+          <a:prstGeom prst="straightConnector1">
+            <a:avLst/>
+          </a:prstGeom>
+          <a:ln w="57150">
+            <a:solidFill>
+              <a:schemeClr val="tx1"/>
+            </a:solidFill>
+            <a:tailEnd type="triangle"/>
+          </a:ln>
+        </p:spPr>
+        <p:style>
+          <a:lnRef idx="1">
+            <a:schemeClr val="accent1"/>
+          </a:lnRef>
+          <a:fillRef idx="0">
+            <a:schemeClr val="accent1"/>
+          </a:fillRef>
+          <a:effectRef idx="0">
+            <a:schemeClr val="accent1"/>
+          </a:effectRef>
+          <a:fontRef idx="minor">
+            <a:schemeClr val="tx1"/>
+          </a:fontRef>
+        </p:style>
+      </p:cxnSp>
+    </p:spTree>
+    <p:extLst>
+      <p:ext uri="{BB962C8B-B14F-4D97-AF65-F5344CB8AC3E}">
+        <p14:creationId xmlns:p14="http://schemas.microsoft.com/office/powerpoint/2010/main" val="875457786"/>
+      </p:ext>
+    </p:extLst>
+  </p:cSld>
+  <p:clrMapOvr>
+    <a:masterClrMapping/>
+  </p:clrMapOvr>
+</p:sld>
+</file>
+
+<file path=ppt/slides/slide11.xml><?xml version="1.0" encoding="utf-8"?>
+<p:sld xmlns:a="http://schemas.openxmlformats.org/drawingml/2006/main" xmlns:r="http://schemas.openxmlformats.org/officeDocument/2006/relationships" xmlns:p="http://schemas.openxmlformats.org/presentationml/2006/main">
+  <p:cSld>
+    <p:spTree>
+      <p:nvGrpSpPr>
+        <p:cNvPr id="1" name=""/>
+        <p:cNvGrpSpPr/>
+        <p:nvPr/>
+      </p:nvGrpSpPr>
+      <p:grpSpPr>
+        <a:xfrm>
+          <a:off x="0" y="0"/>
+          <a:ext cx="0" cy="0"/>
+          <a:chOff x="0" y="0"/>
+          <a:chExt cx="0" cy="0"/>
+        </a:xfrm>
+      </p:grpSpPr>
+      <p:sp>
+        <p:nvSpPr>
+          <p:cNvPr id="2" name="標題 1">
+            <a:extLst>
+              <a:ext uri="{FF2B5EF4-FFF2-40B4-BE49-F238E27FC236}">
+                <a16:creationId xmlns:a16="http://schemas.microsoft.com/office/drawing/2014/main" id="{9AF43229-233F-4772-95BE-770B34EB26B7}"/>
+              </a:ext>
+            </a:extLst>
+          </p:cNvPr>
+          <p:cNvSpPr>
+            <a:spLocks noGrp="1"/>
+          </p:cNvSpPr>
+          <p:nvPr>
+            <p:ph type="title"/>
+          </p:nvPr>
+        </p:nvSpPr>
+        <p:spPr/>
+        <p:txBody>
+          <a:bodyPr/>
+          <a:lstStyle/>
+          <a:p>
+            <a:r>
+              <a:rPr lang="en-US" altLang="zh-TW" dirty="0"/>
+              <a:t>Simple ARIMA-LSTM</a:t>
+            </a:r>
+            <a:r>
+              <a:rPr lang="zh-TW" altLang="en-US" dirty="0"/>
+              <a:t> </a:t>
+            </a:r>
+            <a:r>
+              <a:rPr lang="en-US" altLang="zh-TW" dirty="0"/>
+              <a:t>Hybrid Model</a:t>
+            </a:r>
+            <a:endParaRPr lang="zh-TW" altLang="en-US" dirty="0"/>
+          </a:p>
+        </p:txBody>
+      </p:sp>
+      <p:sp>
+        <p:nvSpPr>
+          <p:cNvPr id="3" name="內容版面配置區 2">
+            <a:extLst>
+              <a:ext uri="{FF2B5EF4-FFF2-40B4-BE49-F238E27FC236}">
+                <a16:creationId xmlns:a16="http://schemas.microsoft.com/office/drawing/2014/main" id="{DDE4AD7B-89E6-406C-8B46-AECFCC1C8829}"/>
+              </a:ext>
+            </a:extLst>
+          </p:cNvPr>
+          <p:cNvSpPr>
+            <a:spLocks noGrp="1"/>
+          </p:cNvSpPr>
+          <p:nvPr>
+            <p:ph idx="1"/>
+          </p:nvPr>
+        </p:nvSpPr>
+        <p:spPr/>
+        <p:txBody>
+          <a:bodyPr/>
+          <a:lstStyle/>
+          <a:p>
+            <a:endParaRPr lang="zh-TW" altLang="en-US"/>
+          </a:p>
+        </p:txBody>
+      </p:sp>
+      <p:pic>
+        <p:nvPicPr>
+          <p:cNvPr id="1028" name="Picture 4">
+            <a:extLst>
+              <a:ext uri="{FF2B5EF4-FFF2-40B4-BE49-F238E27FC236}">
+                <a16:creationId xmlns:a16="http://schemas.microsoft.com/office/drawing/2014/main" id="{0C49AC14-0B24-4DD4-91F1-0F1F06BC0E40}"/>
+              </a:ext>
+            </a:extLst>
+          </p:cNvPr>
+          <p:cNvPicPr>
+            <a:picLocks noChangeAspect="1" noChangeArrowheads="1"/>
+          </p:cNvPicPr>
+          <p:nvPr/>
+        </p:nvPicPr>
+        <p:blipFill>
+          <a:blip r:embed="rId2">
+            <a:extLst>
+              <a:ext uri="{28A0092B-C50C-407E-A947-70E740481C1C}">
+                <a14:useLocalDpi xmlns:a14="http://schemas.microsoft.com/office/drawing/2010/main" val="0"/>
+              </a:ext>
+            </a:extLst>
+          </a:blip>
+          <a:srcRect/>
+          <a:stretch>
+            <a:fillRect/>
+          </a:stretch>
+        </p:blipFill>
+        <p:spPr bwMode="auto">
+          <a:xfrm>
+            <a:off x="159962" y="1058091"/>
+            <a:ext cx="11872076" cy="5582864"/>
+          </a:xfrm>
+          <a:prstGeom prst="rect">
+            <a:avLst/>
+          </a:prstGeom>
+          <a:noFill/>
+          <a:extLst>
+            <a:ext uri="{909E8E84-426E-40DD-AFC4-6F175D3DCCD1}">
+              <a14:hiddenFill xmlns:a14="http://schemas.microsoft.com/office/drawing/2010/main">
+                <a:solidFill>
+                  <a:srgbClr val="FFFFFF"/>
+                </a:solidFill>
+              </a14:hiddenFill>
+            </a:ext>
+          </a:extLst>
+        </p:spPr>
+      </p:pic>
+    </p:spTree>
+    <p:extLst>
+      <p:ext uri="{BB962C8B-B14F-4D97-AF65-F5344CB8AC3E}">
+        <p14:creationId xmlns:p14="http://schemas.microsoft.com/office/powerpoint/2010/main" val="3646300598"/>
+      </p:ext>
+    </p:extLst>
+  </p:cSld>
+  <p:clrMapOvr>
+    <a:masterClrMapping/>
+  </p:clrMapOvr>
+</p:sld>
+</file>
+
+<file path=ppt/slides/slide12.xml><?xml version="1.0" encoding="utf-8"?>
+<p:sld xmlns:a="http://schemas.openxmlformats.org/drawingml/2006/main" xmlns:r="http://schemas.openxmlformats.org/officeDocument/2006/relationships" xmlns:p="http://schemas.openxmlformats.org/presentationml/2006/main">
+  <p:cSld>
+    <p:spTree>
+      <p:nvGrpSpPr>
+        <p:cNvPr id="1" name=""/>
+        <p:cNvGrpSpPr/>
+        <p:nvPr/>
+      </p:nvGrpSpPr>
+      <p:grpSpPr>
+        <a:xfrm>
+          <a:off x="0" y="0"/>
+          <a:ext cx="0" cy="0"/>
+          <a:chOff x="0" y="0"/>
+          <a:chExt cx="0" cy="0"/>
+        </a:xfrm>
+      </p:grpSpPr>
+      <p:sp>
+        <p:nvSpPr>
+          <p:cNvPr id="2" name="標題 1">
+            <a:extLst>
+              <a:ext uri="{FF2B5EF4-FFF2-40B4-BE49-F238E27FC236}">
+                <a16:creationId xmlns:a16="http://schemas.microsoft.com/office/drawing/2014/main" id="{26A73B81-75CD-4A29-BCD4-E9C038D733FC}"/>
+              </a:ext>
+            </a:extLst>
+          </p:cNvPr>
+          <p:cNvSpPr>
+            <a:spLocks noGrp="1"/>
+          </p:cNvSpPr>
+          <p:nvPr>
+            <p:ph type="title"/>
+          </p:nvPr>
+        </p:nvSpPr>
+        <p:spPr/>
+        <p:txBody>
+          <a:bodyPr/>
+          <a:lstStyle/>
+          <a:p>
+            <a:r>
+              <a:rPr lang="en-US" altLang="zh-TW" dirty="0"/>
+              <a:t>Simple ARIMA-LSTM</a:t>
+            </a:r>
+            <a:r>
+              <a:rPr lang="zh-TW" altLang="en-US" dirty="0"/>
+              <a:t> </a:t>
+            </a:r>
+            <a:r>
+              <a:rPr lang="en-US" altLang="zh-TW" dirty="0"/>
+              <a:t>Hybrid Model</a:t>
+            </a:r>
+            <a:endParaRPr lang="zh-TW" altLang="en-US" dirty="0"/>
+          </a:p>
+        </p:txBody>
+      </p:sp>
+      <p:sp>
+        <p:nvSpPr>
+          <p:cNvPr id="3" name="內容版面配置區 2">
+            <a:extLst>
+              <a:ext uri="{FF2B5EF4-FFF2-40B4-BE49-F238E27FC236}">
+                <a16:creationId xmlns:a16="http://schemas.microsoft.com/office/drawing/2014/main" id="{D3C0EFFC-FD01-425A-8C87-98AB9155376D}"/>
+              </a:ext>
+            </a:extLst>
+          </p:cNvPr>
+          <p:cNvSpPr>
+            <a:spLocks noGrp="1"/>
+          </p:cNvSpPr>
+          <p:nvPr>
+            <p:ph idx="1"/>
+          </p:nvPr>
+        </p:nvSpPr>
+        <p:spPr/>
+        <p:txBody>
+          <a:bodyPr/>
+          <a:lstStyle/>
+          <a:p>
+            <a:r>
+              <a:rPr lang="en-US" altLang="zh-TW" dirty="0"/>
+              <a:t>Mean = (ARIMA+LSTM)/2</a:t>
+            </a:r>
+          </a:p>
+          <a:p>
+            <a:r>
+              <a:rPr lang="en-US" altLang="zh-TW" dirty="0"/>
+              <a:t>ADD = (ARIMA+LSTM)</a:t>
+            </a:r>
+            <a:endParaRPr lang="zh-TW" altLang="en-US" dirty="0"/>
+          </a:p>
+          <a:p>
+            <a:endParaRPr lang="zh-TW" altLang="en-US" dirty="0"/>
+          </a:p>
+        </p:txBody>
+      </p:sp>
+    </p:spTree>
+    <p:extLst>
+      <p:ext uri="{BB962C8B-B14F-4D97-AF65-F5344CB8AC3E}">
+        <p14:creationId xmlns:p14="http://schemas.microsoft.com/office/powerpoint/2010/main" val="916649549"/>
+      </p:ext>
+    </p:extLst>
+  </p:cSld>
+  <p:clrMapOvr>
+    <a:masterClrMapping/>
+  </p:clrMapOvr>
+</p:sld>
+</file>
+
+<file path=ppt/slides/slide13.xml><?xml version="1.0" encoding="utf-8"?>
+<p:sld xmlns:a="http://schemas.openxmlformats.org/drawingml/2006/main" xmlns:r="http://schemas.openxmlformats.org/officeDocument/2006/relationships" xmlns:p="http://schemas.openxmlformats.org/presentationml/2006/main">
+  <p:cSld>
+    <p:spTree>
+      <p:nvGrpSpPr>
+        <p:cNvPr id="1" name=""/>
+        <p:cNvGrpSpPr/>
+        <p:nvPr/>
+      </p:nvGrpSpPr>
+      <p:grpSpPr>
+        <a:xfrm>
+          <a:off x="0" y="0"/>
+          <a:ext cx="0" cy="0"/>
+          <a:chOff x="0" y="0"/>
+          <a:chExt cx="0" cy="0"/>
+        </a:xfrm>
+      </p:grpSpPr>
+      <p:sp>
+        <p:nvSpPr>
+          <p:cNvPr id="2" name="標題 1">
+            <a:extLst>
+              <a:ext uri="{FF2B5EF4-FFF2-40B4-BE49-F238E27FC236}">
+                <a16:creationId xmlns:a16="http://schemas.microsoft.com/office/drawing/2014/main" id="{9AF43229-233F-4772-95BE-770B34EB26B7}"/>
+              </a:ext>
+            </a:extLst>
+          </p:cNvPr>
+          <p:cNvSpPr>
+            <a:spLocks noGrp="1"/>
+          </p:cNvSpPr>
+          <p:nvPr>
+            <p:ph type="title"/>
+          </p:nvPr>
+        </p:nvSpPr>
+        <p:spPr/>
+        <p:txBody>
+          <a:bodyPr/>
+          <a:lstStyle/>
+          <a:p>
+            <a:r>
+              <a:rPr lang="en-US" altLang="zh-TW" dirty="0"/>
+              <a:t>Simple ARIMA-LSTM</a:t>
+            </a:r>
+            <a:r>
+              <a:rPr lang="zh-TW" altLang="en-US" dirty="0"/>
+              <a:t> </a:t>
+            </a:r>
+            <a:r>
+              <a:rPr lang="en-US" altLang="zh-TW" dirty="0"/>
+              <a:t>Hybrid Model</a:t>
+            </a:r>
+            <a:endParaRPr lang="zh-TW" altLang="en-US" dirty="0"/>
+          </a:p>
+        </p:txBody>
+      </p:sp>
+      <p:sp>
+        <p:nvSpPr>
+          <p:cNvPr id="3" name="內容版面配置區 2">
+            <a:extLst>
+              <a:ext uri="{FF2B5EF4-FFF2-40B4-BE49-F238E27FC236}">
+                <a16:creationId xmlns:a16="http://schemas.microsoft.com/office/drawing/2014/main" id="{DDE4AD7B-89E6-406C-8B46-AECFCC1C8829}"/>
+              </a:ext>
+            </a:extLst>
+          </p:cNvPr>
+          <p:cNvSpPr>
+            <a:spLocks noGrp="1"/>
+          </p:cNvSpPr>
+          <p:nvPr>
+            <p:ph idx="1"/>
+          </p:nvPr>
+        </p:nvSpPr>
+        <p:spPr/>
+        <p:txBody>
+          <a:bodyPr/>
+          <a:lstStyle/>
+          <a:p>
+            <a:endParaRPr lang="zh-TW" altLang="en-US"/>
+          </a:p>
+        </p:txBody>
+      </p:sp>
+      <p:pic>
+        <p:nvPicPr>
+          <p:cNvPr id="2050" name="Picture 2">
+            <a:extLst>
+              <a:ext uri="{FF2B5EF4-FFF2-40B4-BE49-F238E27FC236}">
+                <a16:creationId xmlns:a16="http://schemas.microsoft.com/office/drawing/2014/main" id="{068D3253-9E4F-4199-8670-6A031BD5156F}"/>
+              </a:ext>
+            </a:extLst>
+          </p:cNvPr>
+          <p:cNvPicPr>
+            <a:picLocks noChangeAspect="1" noChangeArrowheads="1"/>
+          </p:cNvPicPr>
+          <p:nvPr/>
+        </p:nvPicPr>
+        <p:blipFill>
+          <a:blip r:embed="rId2">
+            <a:extLst>
+              <a:ext uri="{28A0092B-C50C-407E-A947-70E740481C1C}">
+                <a14:useLocalDpi xmlns:a14="http://schemas.microsoft.com/office/drawing/2010/main" val="0"/>
+              </a:ext>
+            </a:extLst>
+          </a:blip>
+          <a:srcRect/>
+          <a:stretch>
+            <a:fillRect/>
+          </a:stretch>
+        </p:blipFill>
+        <p:spPr bwMode="auto">
+          <a:xfrm>
+            <a:off x="195942" y="888274"/>
+            <a:ext cx="11765813" cy="5596932"/>
+          </a:xfrm>
+          <a:prstGeom prst="rect">
+            <a:avLst/>
+          </a:prstGeom>
+          <a:noFill/>
+          <a:extLst>
+            <a:ext uri="{909E8E84-426E-40DD-AFC4-6F175D3DCCD1}">
+              <a14:hiddenFill xmlns:a14="http://schemas.microsoft.com/office/drawing/2010/main">
+                <a:solidFill>
+                  <a:srgbClr val="FFFFFF"/>
+                </a:solidFill>
+              </a14:hiddenFill>
+            </a:ext>
+          </a:extLst>
+        </p:spPr>
+      </p:pic>
+    </p:spTree>
+    <p:extLst>
+      <p:ext uri="{BB962C8B-B14F-4D97-AF65-F5344CB8AC3E}">
+        <p14:creationId xmlns:p14="http://schemas.microsoft.com/office/powerpoint/2010/main" val="917092461"/>
+      </p:ext>
+    </p:extLst>
+  </p:cSld>
+  <p:clrMapOvr>
+    <a:masterClrMapping/>
+  </p:clrMapOvr>
+</p:sld>
+</file>
+
+<file path=ppt/slides/slide14.xml><?xml version="1.0" encoding="utf-8"?>
+<p:sld xmlns:a="http://schemas.openxmlformats.org/drawingml/2006/main" xmlns:r="http://schemas.openxmlformats.org/officeDocument/2006/relationships" xmlns:p="http://schemas.openxmlformats.org/presentationml/2006/main">
+  <p:cSld>
+    <p:spTree>
+      <p:nvGrpSpPr>
+        <p:cNvPr id="1" name=""/>
+        <p:cNvGrpSpPr/>
+        <p:nvPr/>
+      </p:nvGrpSpPr>
+      <p:grpSpPr>
+        <a:xfrm>
+          <a:off x="0" y="0"/>
+          <a:ext cx="0" cy="0"/>
+          <a:chOff x="0" y="0"/>
+          <a:chExt cx="0" cy="0"/>
+        </a:xfrm>
+      </p:grpSpPr>
+      <p:sp>
+        <p:nvSpPr>
+          <p:cNvPr id="2" name="標題 1">
+            <a:extLst>
+              <a:ext uri="{FF2B5EF4-FFF2-40B4-BE49-F238E27FC236}">
+                <a16:creationId xmlns:a16="http://schemas.microsoft.com/office/drawing/2014/main" id="{8B44A68C-DA96-4C32-9613-DC20C071CC0E}"/>
+              </a:ext>
+            </a:extLst>
+          </p:cNvPr>
+          <p:cNvSpPr>
+            <a:spLocks noGrp="1"/>
+          </p:cNvSpPr>
+          <p:nvPr>
+            <p:ph type="title"/>
+          </p:nvPr>
+        </p:nvSpPr>
+        <p:spPr/>
+        <p:txBody>
+          <a:bodyPr/>
+          <a:lstStyle/>
+          <a:p>
+            <a:r>
+              <a:rPr lang="en-US" altLang="zh-TW" dirty="0"/>
+              <a:t>Result</a:t>
+            </a:r>
+            <a:endParaRPr lang="zh-TW" altLang="en-US" dirty="0"/>
+          </a:p>
+        </p:txBody>
+      </p:sp>
+      <p:sp>
+        <p:nvSpPr>
+          <p:cNvPr id="3" name="內容版面配置區 2">
+            <a:extLst>
+              <a:ext uri="{FF2B5EF4-FFF2-40B4-BE49-F238E27FC236}">
+                <a16:creationId xmlns:a16="http://schemas.microsoft.com/office/drawing/2014/main" id="{DB009C23-AAAB-4100-9B49-7B9DD6E205B3}"/>
+              </a:ext>
+            </a:extLst>
+          </p:cNvPr>
+          <p:cNvSpPr>
+            <a:spLocks noGrp="1"/>
+          </p:cNvSpPr>
+          <p:nvPr>
+            <p:ph idx="1"/>
+          </p:nvPr>
+        </p:nvSpPr>
+        <p:spPr/>
+        <p:txBody>
+          <a:bodyPr>
+            <a:normAutofit fontScale="77500" lnSpcReduction="20000"/>
+          </a:bodyPr>
+          <a:lstStyle/>
+          <a:p>
+            <a:r>
+              <a:rPr lang="en-US" altLang="zh-TW" dirty="0"/>
+              <a:t>ARIMA Test Score: 0.41 MAE</a:t>
+            </a:r>
+          </a:p>
+          <a:p>
+            <a:r>
+              <a:rPr lang="en-US" altLang="zh-TW" dirty="0"/>
+              <a:t>ARIMA Test Score: 0.56 RMSE</a:t>
+            </a:r>
+          </a:p>
+          <a:p>
+            <a:endParaRPr lang="en-US" altLang="zh-TW" dirty="0"/>
+          </a:p>
+          <a:p>
+            <a:endParaRPr lang="en-US" altLang="zh-TW" dirty="0"/>
+          </a:p>
+          <a:p>
+            <a:r>
+              <a:rPr lang="en-US" altLang="zh-TW" dirty="0"/>
+              <a:t>LSTM Test Score: 0.39 MAE</a:t>
+            </a:r>
+          </a:p>
+          <a:p>
+            <a:r>
+              <a:rPr lang="en-US" altLang="zh-TW" dirty="0"/>
+              <a:t>LSTM Test Score: 0.56 RMSE</a:t>
+            </a:r>
+          </a:p>
+          <a:p>
+            <a:endParaRPr lang="en-US" altLang="zh-TW" dirty="0"/>
+          </a:p>
+          <a:p>
+            <a:endParaRPr lang="en-US" altLang="zh-TW" dirty="0"/>
+          </a:p>
+          <a:p>
+            <a:r>
+              <a:rPr lang="en-US" altLang="zh-TW" dirty="0"/>
+              <a:t>Hybrid model mean Test Score: 0.39 MAE</a:t>
+            </a:r>
+          </a:p>
+          <a:p>
+            <a:r>
+              <a:rPr lang="en-US" altLang="zh-TW" dirty="0"/>
+              <a:t>Hybrid model mean Test Score: 0.55 RMSE</a:t>
+            </a:r>
+          </a:p>
+          <a:p>
+            <a:endParaRPr lang="en-US" altLang="zh-TW" dirty="0"/>
+          </a:p>
+          <a:p>
+            <a:endParaRPr lang="en-US" altLang="zh-TW" dirty="0"/>
+          </a:p>
+          <a:p>
+            <a:r>
+              <a:rPr lang="en-US" altLang="zh-TW" dirty="0"/>
+              <a:t>Hybrid model add Test Score: 1.09 MAE</a:t>
+            </a:r>
+          </a:p>
+          <a:p>
+            <a:r>
+              <a:rPr lang="en-US" altLang="zh-TW" dirty="0"/>
+              <a:t>Hybrid model add Test Score: 1.29 RMSE</a:t>
+            </a:r>
+          </a:p>
+          <a:p>
+            <a:endParaRPr lang="zh-TW" altLang="en-US" dirty="0"/>
+          </a:p>
+        </p:txBody>
+      </p:sp>
+    </p:spTree>
+    <p:extLst>
+      <p:ext uri="{BB962C8B-B14F-4D97-AF65-F5344CB8AC3E}">
+        <p14:creationId xmlns:p14="http://schemas.microsoft.com/office/powerpoint/2010/main" val="866621388"/>
+      </p:ext>
+    </p:extLst>
+  </p:cSld>
+  <p:clrMapOvr>
+    <a:masterClrMapping/>
+  </p:clrMapOvr>
+</p:sld>
+</file>
+
+<file path=ppt/slides/slide15.xml><?xml version="1.0" encoding="utf-8"?>
+<p:sld xmlns:a="http://schemas.openxmlformats.org/drawingml/2006/main" xmlns:r="http://schemas.openxmlformats.org/officeDocument/2006/relationships" xmlns:p="http://schemas.openxmlformats.org/presentationml/2006/main">
+  <p:cSld>
+    <p:spTree>
+      <p:nvGrpSpPr>
+        <p:cNvPr id="1" name=""/>
+        <p:cNvGrpSpPr/>
+        <p:nvPr/>
+      </p:nvGrpSpPr>
+      <p:grpSpPr>
+        <a:xfrm>
+          <a:off x="0" y="0"/>
+          <a:ext cx="0" cy="0"/>
+          <a:chOff x="0" y="0"/>
+          <a:chExt cx="0" cy="0"/>
+        </a:xfrm>
+      </p:grpSpPr>
+      <p:sp>
+        <p:nvSpPr>
+          <p:cNvPr id="2" name="標題 1">
+            <a:extLst>
+              <a:ext uri="{FF2B5EF4-FFF2-40B4-BE49-F238E27FC236}">
+                <a16:creationId xmlns:a16="http://schemas.microsoft.com/office/drawing/2014/main" id="{AA827ABE-B7D4-4F69-81E0-D716CC68979D}"/>
+              </a:ext>
+            </a:extLst>
+          </p:cNvPr>
+          <p:cNvSpPr>
+            <a:spLocks noGrp="1"/>
+          </p:cNvSpPr>
+          <p:nvPr>
+            <p:ph type="title"/>
+          </p:nvPr>
+        </p:nvSpPr>
+        <p:spPr/>
+        <p:txBody>
+          <a:bodyPr/>
+          <a:lstStyle/>
+          <a:p>
+            <a:r>
+              <a:rPr lang="en-US" altLang="zh-TW" dirty="0"/>
+              <a:t>ARIMA-LSTM</a:t>
+            </a:r>
+            <a:r>
+              <a:rPr lang="zh-TW" altLang="en-US" dirty="0"/>
+              <a:t> </a:t>
+            </a:r>
+            <a:r>
+              <a:rPr lang="en-US" altLang="zh-TW" dirty="0"/>
+              <a:t>Hybrid Model</a:t>
+            </a:r>
+            <a:endParaRPr lang="zh-TW" altLang="en-US" dirty="0"/>
+          </a:p>
+        </p:txBody>
+      </p:sp>
+      <p:sp>
+        <p:nvSpPr>
+          <p:cNvPr id="3" name="內容版面配置區 2">
+            <a:extLst>
+              <a:ext uri="{FF2B5EF4-FFF2-40B4-BE49-F238E27FC236}">
+                <a16:creationId xmlns:a16="http://schemas.microsoft.com/office/drawing/2014/main" id="{06B9256C-3796-4191-918F-33BCDA8C74F2}"/>
+              </a:ext>
+            </a:extLst>
+          </p:cNvPr>
+          <p:cNvSpPr>
+            <a:spLocks noGrp="1"/>
+          </p:cNvSpPr>
+          <p:nvPr>
+            <p:ph idx="1"/>
+          </p:nvPr>
+        </p:nvSpPr>
+        <p:spPr/>
+        <p:txBody>
+          <a:bodyPr/>
+          <a:lstStyle/>
+          <a:p>
+            <a:endParaRPr lang="zh-TW" altLang="en-US"/>
+          </a:p>
+        </p:txBody>
+      </p:sp>
+      <p:pic>
+        <p:nvPicPr>
+          <p:cNvPr id="4" name="圖片 3">
+            <a:extLst>
+              <a:ext uri="{FF2B5EF4-FFF2-40B4-BE49-F238E27FC236}">
+                <a16:creationId xmlns:a16="http://schemas.microsoft.com/office/drawing/2014/main" id="{F9BF5186-FA23-4C44-99C9-8CAA3FECCE2E}"/>
+              </a:ext>
+            </a:extLst>
+          </p:cNvPr>
+          <p:cNvPicPr>
+            <a:picLocks noChangeAspect="1"/>
+          </p:cNvPicPr>
+          <p:nvPr/>
+        </p:nvPicPr>
+        <p:blipFill>
+          <a:blip r:embed="rId2"/>
+          <a:stretch>
+            <a:fillRect/>
+          </a:stretch>
+        </p:blipFill>
+        <p:spPr>
+          <a:xfrm>
+            <a:off x="0" y="1285875"/>
+            <a:ext cx="12192000" cy="4286250"/>
+          </a:xfrm>
+          <a:prstGeom prst="rect">
+            <a:avLst/>
+          </a:prstGeom>
+        </p:spPr>
+      </p:pic>
+    </p:spTree>
+    <p:extLst>
+      <p:ext uri="{BB962C8B-B14F-4D97-AF65-F5344CB8AC3E}">
+        <p14:creationId xmlns:p14="http://schemas.microsoft.com/office/powerpoint/2010/main" val="4047098667"/>
+      </p:ext>
+    </p:extLst>
+  </p:cSld>
+  <p:clrMapOvr>
+    <a:masterClrMapping/>
+  </p:clrMapOvr>
+</p:sld>
+</file>
+
+<file path=ppt/slides/slide16.xml><?xml version="1.0" encoding="utf-8"?>
+<p:sld xmlns:a="http://schemas.openxmlformats.org/drawingml/2006/main" xmlns:r="http://schemas.openxmlformats.org/officeDocument/2006/relationships" xmlns:p="http://schemas.openxmlformats.org/presentationml/2006/main">
+  <p:cSld>
+    <p:spTree>
+      <p:nvGrpSpPr>
+        <p:cNvPr id="1" name=""/>
+        <p:cNvGrpSpPr/>
+        <p:nvPr/>
+      </p:nvGrpSpPr>
+      <p:grpSpPr>
+        <a:xfrm>
+          <a:off x="0" y="0"/>
+          <a:ext cx="0" cy="0"/>
+          <a:chOff x="0" y="0"/>
+          <a:chExt cx="0" cy="0"/>
+        </a:xfrm>
+      </p:grpSpPr>
+      <p:sp>
+        <p:nvSpPr>
+          <p:cNvPr id="2" name="標題 1">
+            <a:extLst>
+              <a:ext uri="{FF2B5EF4-FFF2-40B4-BE49-F238E27FC236}">
+                <a16:creationId xmlns:a16="http://schemas.microsoft.com/office/drawing/2014/main" id="{7E79E964-EDC0-4D6E-9591-A9D91E78E409}"/>
+              </a:ext>
+            </a:extLst>
+          </p:cNvPr>
+          <p:cNvSpPr>
+            <a:spLocks noGrp="1"/>
+          </p:cNvSpPr>
+          <p:nvPr>
+            <p:ph type="title"/>
+          </p:nvPr>
+        </p:nvSpPr>
+        <p:spPr/>
+        <p:txBody>
+          <a:bodyPr/>
+          <a:lstStyle/>
+          <a:p>
+            <a:r>
+              <a:rPr lang="en-US" altLang="zh-TW" dirty="0"/>
+              <a:t>ARIMA-LSTM</a:t>
+            </a:r>
+            <a:r>
+              <a:rPr lang="zh-TW" altLang="en-US" dirty="0"/>
+              <a:t> </a:t>
+            </a:r>
+            <a:r>
+              <a:rPr lang="en-US" altLang="zh-TW" dirty="0"/>
+              <a:t>Hybrid Model</a:t>
+            </a:r>
+            <a:endParaRPr lang="zh-TW" altLang="en-US" dirty="0"/>
+          </a:p>
+        </p:txBody>
+      </p:sp>
+      <p:sp>
+        <p:nvSpPr>
+          <p:cNvPr id="3" name="內容版面配置區 2">
+            <a:extLst>
+              <a:ext uri="{FF2B5EF4-FFF2-40B4-BE49-F238E27FC236}">
+                <a16:creationId xmlns:a16="http://schemas.microsoft.com/office/drawing/2014/main" id="{5C5B93AF-A127-4948-8EF5-46E4B8E7EADE}"/>
+              </a:ext>
+            </a:extLst>
+          </p:cNvPr>
+          <p:cNvSpPr>
+            <a:spLocks noGrp="1"/>
+          </p:cNvSpPr>
+          <p:nvPr>
+            <p:ph idx="1"/>
+          </p:nvPr>
+        </p:nvSpPr>
+        <p:spPr/>
+        <p:txBody>
+          <a:bodyPr/>
+          <a:lstStyle/>
+          <a:p>
+            <a:pPr marL="514350" indent="-514350">
+              <a:buFont typeface="+mj-lt"/>
+              <a:buAutoNum type="arabicPeriod"/>
+            </a:pPr>
+            <a:r>
+              <a:rPr lang="en-US" altLang="zh-TW" dirty="0"/>
+              <a:t>Hybrid Model prediction value </a:t>
+            </a:r>
+          </a:p>
+          <a:p>
+            <a:pPr marL="0" indent="0">
+              <a:buNone/>
+            </a:pPr>
+            <a:r>
+              <a:rPr lang="en-US" altLang="zh-TW" dirty="0"/>
+              <a:t>     = linear components + nonlinear components</a:t>
+            </a:r>
+          </a:p>
+          <a:p>
+            <a:pPr marL="514350" indent="-514350">
+              <a:buFont typeface="+mj-lt"/>
+              <a:buAutoNum type="arabicPeriod" startAt="2"/>
+            </a:pPr>
+            <a:r>
+              <a:rPr lang="en-US" altLang="zh-TW" dirty="0"/>
+              <a:t>Calculate linear(ARIMA) error and nonlinear(LSTM) error</a:t>
+            </a:r>
+          </a:p>
+          <a:p>
+            <a:pPr marL="0" indent="0">
+              <a:buNone/>
+            </a:pPr>
+            <a:endParaRPr lang="en-US" altLang="zh-TW" dirty="0"/>
+          </a:p>
+          <a:p>
+            <a:pPr marL="0" indent="0">
+              <a:buNone/>
+            </a:pPr>
+            <a:endParaRPr lang="en-US" altLang="zh-TW" dirty="0"/>
+          </a:p>
+          <a:p>
+            <a:pPr marL="0" indent="0">
+              <a:buNone/>
+            </a:pPr>
+            <a:endParaRPr lang="en-US" altLang="zh-TW" dirty="0"/>
+          </a:p>
+          <a:p>
+            <a:pPr marL="0" indent="0">
+              <a:buNone/>
+            </a:pPr>
+            <a:endParaRPr lang="zh-TW" altLang="en-US" dirty="0"/>
+          </a:p>
+        </p:txBody>
+      </p:sp>
+      <p:pic>
+        <p:nvPicPr>
+          <p:cNvPr id="4" name="圖片 3">
+            <a:extLst>
+              <a:ext uri="{FF2B5EF4-FFF2-40B4-BE49-F238E27FC236}">
+                <a16:creationId xmlns:a16="http://schemas.microsoft.com/office/drawing/2014/main" id="{70081C32-33AC-405A-B557-55C61FCD4FDB}"/>
+              </a:ext>
+            </a:extLst>
+          </p:cNvPr>
+          <p:cNvPicPr>
+            <a:picLocks noChangeAspect="1"/>
+          </p:cNvPicPr>
+          <p:nvPr/>
+        </p:nvPicPr>
+        <p:blipFill>
+          <a:blip r:embed="rId2"/>
+          <a:stretch>
+            <a:fillRect/>
+          </a:stretch>
+        </p:blipFill>
+        <p:spPr>
+          <a:xfrm>
+            <a:off x="2933597" y="3195258"/>
+            <a:ext cx="5677692" cy="1733792"/>
+          </a:xfrm>
+          <a:prstGeom prst="rect">
+            <a:avLst/>
+          </a:prstGeom>
+        </p:spPr>
+      </p:pic>
+    </p:spTree>
+    <p:extLst>
+      <p:ext uri="{BB962C8B-B14F-4D97-AF65-F5344CB8AC3E}">
+        <p14:creationId xmlns:p14="http://schemas.microsoft.com/office/powerpoint/2010/main" val="2139759920"/>
+      </p:ext>
+    </p:extLst>
+  </p:cSld>
+  <p:clrMapOvr>
+    <a:masterClrMapping/>
+  </p:clrMapOvr>
+</p:sld>
+</file>
+
+<file path=ppt/slides/slide17.xml><?xml version="1.0" encoding="utf-8"?>
+<p:sld xmlns:a="http://schemas.openxmlformats.org/drawingml/2006/main" xmlns:r="http://schemas.openxmlformats.org/officeDocument/2006/relationships" xmlns:p="http://schemas.openxmlformats.org/presentationml/2006/main">
+  <p:cSld>
+    <p:spTree>
+      <p:nvGrpSpPr>
+        <p:cNvPr id="1" name=""/>
+        <p:cNvGrpSpPr/>
+        <p:nvPr/>
+      </p:nvGrpSpPr>
+      <p:grpSpPr>
+        <a:xfrm>
+          <a:off x="0" y="0"/>
+          <a:ext cx="0" cy="0"/>
+          <a:chOff x="0" y="0"/>
+          <a:chExt cx="0" cy="0"/>
+        </a:xfrm>
+      </p:grpSpPr>
+      <p:sp>
+        <p:nvSpPr>
+          <p:cNvPr id="2" name="標題 1">
+            <a:extLst>
+              <a:ext uri="{FF2B5EF4-FFF2-40B4-BE49-F238E27FC236}">
+                <a16:creationId xmlns:a16="http://schemas.microsoft.com/office/drawing/2014/main" id="{B4EC0C2A-3D96-4C12-96EC-A7CAF29F69CF}"/>
+              </a:ext>
+            </a:extLst>
+          </p:cNvPr>
+          <p:cNvSpPr>
+            <a:spLocks noGrp="1"/>
+          </p:cNvSpPr>
+          <p:nvPr>
+            <p:ph type="title"/>
+          </p:nvPr>
+        </p:nvSpPr>
+        <p:spPr/>
+        <p:txBody>
+          <a:bodyPr/>
+          <a:lstStyle/>
+          <a:p>
+            <a:r>
+              <a:rPr lang="en-US" altLang="zh-TW" dirty="0"/>
+              <a:t>ARIMA-LSTM</a:t>
+            </a:r>
+            <a:r>
+              <a:rPr lang="zh-TW" altLang="en-US" dirty="0"/>
+              <a:t> </a:t>
+            </a:r>
+            <a:r>
+              <a:rPr lang="en-US" altLang="zh-TW" dirty="0"/>
+              <a:t>Hybrid Model</a:t>
+            </a:r>
+            <a:endParaRPr lang="zh-TW" altLang="en-US" dirty="0"/>
+          </a:p>
+        </p:txBody>
+      </p:sp>
+      <p:sp>
+        <p:nvSpPr>
+          <p:cNvPr id="3" name="內容版面配置區 2">
+            <a:extLst>
+              <a:ext uri="{FF2B5EF4-FFF2-40B4-BE49-F238E27FC236}">
+                <a16:creationId xmlns:a16="http://schemas.microsoft.com/office/drawing/2014/main" id="{579CE957-902A-43DE-92E6-142A7ABE1F2E}"/>
+              </a:ext>
+            </a:extLst>
+          </p:cNvPr>
+          <p:cNvSpPr>
+            <a:spLocks noGrp="1"/>
+          </p:cNvSpPr>
+          <p:nvPr>
+            <p:ph idx="1"/>
+          </p:nvPr>
+        </p:nvSpPr>
+        <p:spPr/>
+        <p:txBody>
+          <a:bodyPr/>
+          <a:lstStyle/>
+          <a:p>
+            <a:pPr marL="514350" indent="-514350">
+              <a:buFont typeface="+mj-lt"/>
+              <a:buAutoNum type="arabicPeriod" startAt="3"/>
+            </a:pPr>
+            <a:r>
+              <a:rPr lang="en-US" altLang="zh-TW" dirty="0"/>
+              <a:t>Calculate weight for each model:</a:t>
+            </a:r>
+            <a:endParaRPr lang="zh-TW" altLang="en-US" dirty="0"/>
+          </a:p>
+        </p:txBody>
+      </p:sp>
+      <p:pic>
+        <p:nvPicPr>
+          <p:cNvPr id="4" name="圖片 3">
+            <a:extLst>
+              <a:ext uri="{FF2B5EF4-FFF2-40B4-BE49-F238E27FC236}">
+                <a16:creationId xmlns:a16="http://schemas.microsoft.com/office/drawing/2014/main" id="{2D64A99C-9183-4166-A51D-0897BB1D5AAB}"/>
+              </a:ext>
+            </a:extLst>
+          </p:cNvPr>
+          <p:cNvPicPr>
+            <a:picLocks noChangeAspect="1"/>
+          </p:cNvPicPr>
+          <p:nvPr/>
+        </p:nvPicPr>
+        <p:blipFill>
+          <a:blip r:embed="rId2"/>
+          <a:stretch>
+            <a:fillRect/>
+          </a:stretch>
+        </p:blipFill>
+        <p:spPr>
+          <a:xfrm>
+            <a:off x="2599837" y="1990524"/>
+            <a:ext cx="6992326" cy="2876951"/>
+          </a:xfrm>
+          <a:prstGeom prst="rect">
+            <a:avLst/>
+          </a:prstGeom>
+        </p:spPr>
+      </p:pic>
+    </p:spTree>
+    <p:extLst>
+      <p:ext uri="{BB962C8B-B14F-4D97-AF65-F5344CB8AC3E}">
+        <p14:creationId xmlns:p14="http://schemas.microsoft.com/office/powerpoint/2010/main" val="2540430129"/>
+      </p:ext>
+    </p:extLst>
+  </p:cSld>
+  <p:clrMapOvr>
+    <a:masterClrMapping/>
+  </p:clrMapOvr>
+</p:sld>
+</file>
+
+<file path=ppt/slides/slide18.xml><?xml version="1.0" encoding="utf-8"?>
+<p:sld xmlns:a="http://schemas.openxmlformats.org/drawingml/2006/main" xmlns:r="http://schemas.openxmlformats.org/officeDocument/2006/relationships" xmlns:p="http://schemas.openxmlformats.org/presentationml/2006/main">
+  <p:cSld>
+    <p:spTree>
+      <p:nvGrpSpPr>
+        <p:cNvPr id="1" name=""/>
+        <p:cNvGrpSpPr/>
+        <p:nvPr/>
+      </p:nvGrpSpPr>
+      <p:grpSpPr>
+        <a:xfrm>
+          <a:off x="0" y="0"/>
+          <a:ext cx="0" cy="0"/>
+          <a:chOff x="0" y="0"/>
+          <a:chExt cx="0" cy="0"/>
+        </a:xfrm>
+      </p:grpSpPr>
+      <p:sp>
+        <p:nvSpPr>
+          <p:cNvPr id="2" name="標題 1">
+            <a:extLst>
+              <a:ext uri="{FF2B5EF4-FFF2-40B4-BE49-F238E27FC236}">
+                <a16:creationId xmlns:a16="http://schemas.microsoft.com/office/drawing/2014/main" id="{C6EF2888-A290-4477-9A74-4BD2E9ADC5C7}"/>
+              </a:ext>
+            </a:extLst>
+          </p:cNvPr>
+          <p:cNvSpPr>
+            <a:spLocks noGrp="1"/>
+          </p:cNvSpPr>
+          <p:nvPr>
+            <p:ph type="title"/>
+          </p:nvPr>
+        </p:nvSpPr>
+        <p:spPr/>
+        <p:txBody>
+          <a:bodyPr/>
+          <a:lstStyle/>
+          <a:p>
+            <a:r>
+              <a:rPr lang="en-US" altLang="zh-TW" dirty="0"/>
+              <a:t>ARIMA-LSTM</a:t>
+            </a:r>
+            <a:r>
+              <a:rPr lang="zh-TW" altLang="en-US" dirty="0"/>
+              <a:t> </a:t>
+            </a:r>
+            <a:r>
+              <a:rPr lang="en-US" altLang="zh-TW" dirty="0"/>
+              <a:t>Hybrid Model</a:t>
+            </a:r>
+            <a:endParaRPr lang="zh-TW" altLang="en-US" dirty="0"/>
+          </a:p>
+        </p:txBody>
+      </p:sp>
+      <p:pic>
+        <p:nvPicPr>
+          <p:cNvPr id="4" name="內容版面配置區 3">
+            <a:extLst>
+              <a:ext uri="{FF2B5EF4-FFF2-40B4-BE49-F238E27FC236}">
+                <a16:creationId xmlns:a16="http://schemas.microsoft.com/office/drawing/2014/main" id="{91E969B7-DCA3-4B20-804A-D06ABC3CE15A}"/>
+              </a:ext>
+            </a:extLst>
+          </p:cNvPr>
+          <p:cNvPicPr>
+            <a:picLocks noGrp="1" noChangeAspect="1"/>
+          </p:cNvPicPr>
+          <p:nvPr>
+            <p:ph idx="1"/>
+          </p:nvPr>
+        </p:nvPicPr>
+        <p:blipFill>
+          <a:blip r:embed="rId2"/>
+          <a:stretch>
+            <a:fillRect/>
+          </a:stretch>
+        </p:blipFill>
+        <p:spPr>
+          <a:xfrm>
+            <a:off x="195126" y="2868389"/>
+            <a:ext cx="11744325" cy="1121222"/>
+          </a:xfrm>
+          <a:prstGeom prst="rect">
+            <a:avLst/>
+          </a:prstGeom>
+        </p:spPr>
+      </p:pic>
+    </p:spTree>
+    <p:extLst>
+      <p:ext uri="{BB962C8B-B14F-4D97-AF65-F5344CB8AC3E}">
+        <p14:creationId xmlns:p14="http://schemas.microsoft.com/office/powerpoint/2010/main" val="1657590130"/>
+      </p:ext>
+    </p:extLst>
+  </p:cSld>
+  <p:clrMapOvr>
+    <a:masterClrMapping/>
+  </p:clrMapOvr>
+</p:sld>
+</file>
+
+<file path=ppt/slides/slide19.xml><?xml version="1.0" encoding="utf-8"?>
+<p:sld xmlns:a="http://schemas.openxmlformats.org/drawingml/2006/main" xmlns:r="http://schemas.openxmlformats.org/officeDocument/2006/relationships" xmlns:p="http://schemas.openxmlformats.org/presentationml/2006/main">
+  <p:cSld>
+    <p:spTree>
+      <p:nvGrpSpPr>
+        <p:cNvPr id="1" name=""/>
+        <p:cNvGrpSpPr/>
+        <p:nvPr/>
+      </p:nvGrpSpPr>
+      <p:grpSpPr>
+        <a:xfrm>
+          <a:off x="0" y="0"/>
+          <a:ext cx="0" cy="0"/>
+          <a:chOff x="0" y="0"/>
+          <a:chExt cx="0" cy="0"/>
+        </a:xfrm>
+      </p:grpSpPr>
+      <p:sp>
+        <p:nvSpPr>
+          <p:cNvPr id="2" name="標題 1">
+            <a:extLst>
+              <a:ext uri="{FF2B5EF4-FFF2-40B4-BE49-F238E27FC236}">
+                <a16:creationId xmlns:a16="http://schemas.microsoft.com/office/drawing/2014/main" id="{4BE505B2-615E-453B-8B04-2F0F4A9DAE4A}"/>
+              </a:ext>
+            </a:extLst>
+          </p:cNvPr>
+          <p:cNvSpPr>
+            <a:spLocks noGrp="1"/>
+          </p:cNvSpPr>
+          <p:nvPr>
+            <p:ph type="title"/>
+          </p:nvPr>
+        </p:nvSpPr>
+        <p:spPr/>
+        <p:txBody>
+          <a:bodyPr/>
+          <a:lstStyle/>
+          <a:p>
+            <a:r>
+              <a:rPr lang="en-US" altLang="zh-TW" dirty="0"/>
+              <a:t>ARIMA-LSTM</a:t>
+            </a:r>
+            <a:r>
+              <a:rPr lang="zh-TW" altLang="en-US" dirty="0"/>
+              <a:t> </a:t>
+            </a:r>
+            <a:r>
+              <a:rPr lang="en-US" altLang="zh-TW" dirty="0"/>
+              <a:t>Hybrid Model</a:t>
+            </a:r>
+            <a:endParaRPr lang="zh-TW" altLang="en-US" dirty="0"/>
+          </a:p>
+        </p:txBody>
+      </p:sp>
+      <p:sp>
+        <p:nvSpPr>
+          <p:cNvPr id="3" name="內容版面配置區 2">
+            <a:extLst>
+              <a:ext uri="{FF2B5EF4-FFF2-40B4-BE49-F238E27FC236}">
+                <a16:creationId xmlns:a16="http://schemas.microsoft.com/office/drawing/2014/main" id="{5B9F56E6-E83F-4ABB-9DF4-D5FC71E1625F}"/>
+              </a:ext>
+            </a:extLst>
+          </p:cNvPr>
+          <p:cNvSpPr>
+            <a:spLocks noGrp="1"/>
+          </p:cNvSpPr>
+          <p:nvPr>
+            <p:ph idx="1"/>
+          </p:nvPr>
+        </p:nvSpPr>
+        <p:spPr/>
+        <p:txBody>
+          <a:bodyPr/>
+          <a:lstStyle/>
+          <a:p>
+            <a:pPr marL="514350" indent="-514350">
+              <a:buFont typeface="+mj-lt"/>
+              <a:buAutoNum type="arabicPeriod" startAt="4"/>
+            </a:pPr>
+            <a:r>
+              <a:rPr lang="en-US" altLang="zh-TW" dirty="0"/>
+              <a:t>Finally, calculate the final result</a:t>
+            </a:r>
+            <a:endParaRPr lang="zh-TW" altLang="en-US" dirty="0"/>
+          </a:p>
+        </p:txBody>
+      </p:sp>
+      <p:pic>
+        <p:nvPicPr>
+          <p:cNvPr id="4" name="內容版面配置區 3">
+            <a:extLst>
+              <a:ext uri="{FF2B5EF4-FFF2-40B4-BE49-F238E27FC236}">
+                <a16:creationId xmlns:a16="http://schemas.microsoft.com/office/drawing/2014/main" id="{296ACCD0-B5C9-4488-BB66-F3543CF43D26}"/>
+              </a:ext>
+            </a:extLst>
+          </p:cNvPr>
+          <p:cNvPicPr>
+            <a:picLocks noChangeAspect="1"/>
+          </p:cNvPicPr>
+          <p:nvPr/>
+        </p:nvPicPr>
+        <p:blipFill>
+          <a:blip r:embed="rId2"/>
+          <a:stretch>
+            <a:fillRect/>
+          </a:stretch>
+        </p:blipFill>
+        <p:spPr>
+          <a:xfrm>
+            <a:off x="195126" y="1799244"/>
+            <a:ext cx="11744325" cy="1121222"/>
+          </a:xfrm>
+          <a:prstGeom prst="rect">
+            <a:avLst/>
+          </a:prstGeom>
+        </p:spPr>
+      </p:pic>
+    </p:spTree>
+    <p:extLst>
+      <p:ext uri="{BB962C8B-B14F-4D97-AF65-F5344CB8AC3E}">
+        <p14:creationId xmlns:p14="http://schemas.microsoft.com/office/powerpoint/2010/main" val="383784947"/>
+      </p:ext>
+    </p:extLst>
+  </p:cSld>
+  <p:clrMapOvr>
+    <a:masterClrMapping/>
+  </p:clrMapOvr>
+</p:sld>
+</file>
+
 <file path=ppt/slides/slide2.xml><?xml version="1.0" encoding="utf-8"?>
 <p:sld xmlns:a="http://schemas.openxmlformats.org/drawingml/2006/main" xmlns:r="http://schemas.openxmlformats.org/officeDocument/2006/relationships" xmlns:p="http://schemas.openxmlformats.org/presentationml/2006/main">
   <p:cSld>
@@ -3590,7 +5315,7 @@
           <a:p>
             <a:r>
               <a:rPr lang="en-US" altLang="zh-TW" dirty="0"/>
-              <a:t>sub_metering_4</a:t>
+              <a:t>Sub_metering_4</a:t>
             </a:r>
           </a:p>
           <a:p>
@@ -3608,6 +5333,36 @@
           </a:p>
         </p:txBody>
       </p:sp>
+      <p:pic>
+        <p:nvPicPr>
+          <p:cNvPr id="4" name="圖片 3">
+            <a:extLst>
+              <a:ext uri="{FF2B5EF4-FFF2-40B4-BE49-F238E27FC236}">
+                <a16:creationId xmlns:a16="http://schemas.microsoft.com/office/drawing/2014/main" id="{C79016C1-11BA-4344-BC43-9E222B3B884C}"/>
+              </a:ext>
+            </a:extLst>
+          </p:cNvPr>
+          <p:cNvPicPr>
+            <a:picLocks noChangeAspect="1"/>
+          </p:cNvPicPr>
+          <p:nvPr/>
+        </p:nvPicPr>
+        <p:blipFill>
+          <a:blip r:embed="rId2"/>
+          <a:stretch>
+            <a:fillRect/>
+          </a:stretch>
+        </p:blipFill>
+        <p:spPr>
+          <a:xfrm>
+            <a:off x="4039338" y="2588366"/>
+            <a:ext cx="8057349" cy="4269634"/>
+          </a:xfrm>
+          <a:prstGeom prst="rect">
+            <a:avLst/>
+          </a:prstGeom>
+        </p:spPr>
+      </p:pic>
     </p:spTree>
     <p:extLst>
       <p:ext uri="{BB962C8B-B14F-4D97-AF65-F5344CB8AC3E}">
@@ -3621,7 +5376,561 @@
 </p:sld>
 </file>
 
+<file path=ppt/slides/slide20.xml><?xml version="1.0" encoding="utf-8"?>
+<p:sld xmlns:a="http://schemas.openxmlformats.org/drawingml/2006/main" xmlns:r="http://schemas.openxmlformats.org/officeDocument/2006/relationships" xmlns:p="http://schemas.openxmlformats.org/presentationml/2006/main">
+  <p:cSld>
+    <p:spTree>
+      <p:nvGrpSpPr>
+        <p:cNvPr id="1" name=""/>
+        <p:cNvGrpSpPr/>
+        <p:nvPr/>
+      </p:nvGrpSpPr>
+      <p:grpSpPr>
+        <a:xfrm>
+          <a:off x="0" y="0"/>
+          <a:ext cx="0" cy="0"/>
+          <a:chOff x="0" y="0"/>
+          <a:chExt cx="0" cy="0"/>
+        </a:xfrm>
+      </p:grpSpPr>
+      <p:sp>
+        <p:nvSpPr>
+          <p:cNvPr id="2" name="標題 1">
+            <a:extLst>
+              <a:ext uri="{FF2B5EF4-FFF2-40B4-BE49-F238E27FC236}">
+                <a16:creationId xmlns:a16="http://schemas.microsoft.com/office/drawing/2014/main" id="{F1D7BC84-62A6-45F4-ACE9-B8F7AF111996}"/>
+              </a:ext>
+            </a:extLst>
+          </p:cNvPr>
+          <p:cNvSpPr>
+            <a:spLocks noGrp="1"/>
+          </p:cNvSpPr>
+          <p:nvPr>
+            <p:ph type="title"/>
+          </p:nvPr>
+        </p:nvSpPr>
+        <p:spPr/>
+        <p:txBody>
+          <a:bodyPr/>
+          <a:lstStyle/>
+          <a:p>
+            <a:r>
+              <a:rPr lang="en-US" altLang="zh-TW" dirty="0"/>
+              <a:t>ARIMA-LSTM</a:t>
+            </a:r>
+            <a:r>
+              <a:rPr lang="zh-TW" altLang="en-US" dirty="0"/>
+              <a:t> </a:t>
+            </a:r>
+            <a:r>
+              <a:rPr lang="en-US" altLang="zh-TW" dirty="0"/>
+              <a:t>Hybrid Model</a:t>
+            </a:r>
+            <a:endParaRPr lang="zh-TW" altLang="en-US" dirty="0"/>
+          </a:p>
+        </p:txBody>
+      </p:sp>
+      <p:sp>
+        <p:nvSpPr>
+          <p:cNvPr id="3" name="內容版面配置區 2">
+            <a:extLst>
+              <a:ext uri="{FF2B5EF4-FFF2-40B4-BE49-F238E27FC236}">
+                <a16:creationId xmlns:a16="http://schemas.microsoft.com/office/drawing/2014/main" id="{1D957902-0B17-4B29-9518-345E25C828AB}"/>
+              </a:ext>
+            </a:extLst>
+          </p:cNvPr>
+          <p:cNvSpPr>
+            <a:spLocks noGrp="1"/>
+          </p:cNvSpPr>
+          <p:nvPr>
+            <p:ph idx="1"/>
+          </p:nvPr>
+        </p:nvSpPr>
+        <p:spPr/>
+        <p:txBody>
+          <a:bodyPr/>
+          <a:lstStyle/>
+          <a:p>
+            <a:endParaRPr lang="zh-TW" altLang="en-US"/>
+          </a:p>
+        </p:txBody>
+      </p:sp>
+      <p:pic>
+        <p:nvPicPr>
+          <p:cNvPr id="1026" name="Picture 2">
+            <a:extLst>
+              <a:ext uri="{FF2B5EF4-FFF2-40B4-BE49-F238E27FC236}">
+                <a16:creationId xmlns:a16="http://schemas.microsoft.com/office/drawing/2014/main" id="{30664772-415E-487D-92B4-5DECF47D3DF6}"/>
+              </a:ext>
+            </a:extLst>
+          </p:cNvPr>
+          <p:cNvPicPr>
+            <a:picLocks noChangeAspect="1" noChangeArrowheads="1"/>
+          </p:cNvPicPr>
+          <p:nvPr/>
+        </p:nvPicPr>
+        <p:blipFill>
+          <a:blip r:embed="rId2">
+            <a:extLst>
+              <a:ext uri="{28A0092B-C50C-407E-A947-70E740481C1C}">
+                <a14:useLocalDpi xmlns:a14="http://schemas.microsoft.com/office/drawing/2010/main" val="0"/>
+              </a:ext>
+            </a:extLst>
+          </a:blip>
+          <a:srcRect/>
+          <a:stretch>
+            <a:fillRect/>
+          </a:stretch>
+        </p:blipFill>
+        <p:spPr bwMode="auto">
+          <a:xfrm>
+            <a:off x="687277" y="1058091"/>
+            <a:ext cx="10760840" cy="5118872"/>
+          </a:xfrm>
+          <a:prstGeom prst="rect">
+            <a:avLst/>
+          </a:prstGeom>
+          <a:noFill/>
+          <a:extLst>
+            <a:ext uri="{909E8E84-426E-40DD-AFC4-6F175D3DCCD1}">
+              <a14:hiddenFill xmlns:a14="http://schemas.microsoft.com/office/drawing/2010/main">
+                <a:solidFill>
+                  <a:srgbClr val="FFFFFF"/>
+                </a:solidFill>
+              </a14:hiddenFill>
+            </a:ext>
+          </a:extLst>
+        </p:spPr>
+      </p:pic>
+    </p:spTree>
+    <p:extLst>
+      <p:ext uri="{BB962C8B-B14F-4D97-AF65-F5344CB8AC3E}">
+        <p14:creationId xmlns:p14="http://schemas.microsoft.com/office/powerpoint/2010/main" val="4037048073"/>
+      </p:ext>
+    </p:extLst>
+  </p:cSld>
+  <p:clrMapOvr>
+    <a:masterClrMapping/>
+  </p:clrMapOvr>
+</p:sld>
+</file>
+
+<file path=ppt/slides/slide21.xml><?xml version="1.0" encoding="utf-8"?>
+<p:sld xmlns:a="http://schemas.openxmlformats.org/drawingml/2006/main" xmlns:r="http://schemas.openxmlformats.org/officeDocument/2006/relationships" xmlns:p="http://schemas.openxmlformats.org/presentationml/2006/main">
+  <p:cSld>
+    <p:spTree>
+      <p:nvGrpSpPr>
+        <p:cNvPr id="1" name=""/>
+        <p:cNvGrpSpPr/>
+        <p:nvPr/>
+      </p:nvGrpSpPr>
+      <p:grpSpPr>
+        <a:xfrm>
+          <a:off x="0" y="0"/>
+          <a:ext cx="0" cy="0"/>
+          <a:chOff x="0" y="0"/>
+          <a:chExt cx="0" cy="0"/>
+        </a:xfrm>
+      </p:grpSpPr>
+      <p:sp>
+        <p:nvSpPr>
+          <p:cNvPr id="2" name="標題 1">
+            <a:extLst>
+              <a:ext uri="{FF2B5EF4-FFF2-40B4-BE49-F238E27FC236}">
+                <a16:creationId xmlns:a16="http://schemas.microsoft.com/office/drawing/2014/main" id="{0CF1EE47-CFA6-4EC0-984C-0293A3FB1A05}"/>
+              </a:ext>
+            </a:extLst>
+          </p:cNvPr>
+          <p:cNvSpPr>
+            <a:spLocks noGrp="1"/>
+          </p:cNvSpPr>
+          <p:nvPr>
+            <p:ph type="title"/>
+          </p:nvPr>
+        </p:nvSpPr>
+        <p:spPr/>
+        <p:txBody>
+          <a:bodyPr/>
+          <a:lstStyle/>
+          <a:p>
+            <a:r>
+              <a:rPr lang="en-US" altLang="zh-TW" dirty="0"/>
+              <a:t>Result</a:t>
+            </a:r>
+            <a:endParaRPr lang="zh-TW" altLang="en-US" dirty="0"/>
+          </a:p>
+        </p:txBody>
+      </p:sp>
+      <p:sp>
+        <p:nvSpPr>
+          <p:cNvPr id="3" name="內容版面配置區 2">
+            <a:extLst>
+              <a:ext uri="{FF2B5EF4-FFF2-40B4-BE49-F238E27FC236}">
+                <a16:creationId xmlns:a16="http://schemas.microsoft.com/office/drawing/2014/main" id="{42176AEE-3E8F-4FF0-9090-1A0FB37C6552}"/>
+              </a:ext>
+            </a:extLst>
+          </p:cNvPr>
+          <p:cNvSpPr>
+            <a:spLocks noGrp="1"/>
+          </p:cNvSpPr>
+          <p:nvPr>
+            <p:ph idx="1"/>
+          </p:nvPr>
+        </p:nvSpPr>
+        <p:spPr/>
+        <p:txBody>
+          <a:bodyPr/>
+          <a:lstStyle/>
+          <a:p>
+            <a:r>
+              <a:rPr lang="en-US" altLang="zh-TW" dirty="0"/>
+              <a:t>Simple Hybrid model(mean) Test Score: 0.39 MAE</a:t>
+            </a:r>
+          </a:p>
+          <a:p>
+            <a:r>
+              <a:rPr lang="en-US" altLang="zh-TW" dirty="0"/>
+              <a:t>Simple Hybrid model(mean) Test Score: 0.55 RMSE</a:t>
+            </a:r>
+          </a:p>
+          <a:p>
+            <a:endParaRPr lang="en-US" altLang="zh-TW" dirty="0"/>
+          </a:p>
+          <a:p>
+            <a:r>
+              <a:rPr lang="en-US" altLang="zh-TW" dirty="0"/>
+              <a:t>Simple Hybrid model(add) Test Score: 1.09 MAE</a:t>
+            </a:r>
+          </a:p>
+          <a:p>
+            <a:r>
+              <a:rPr lang="en-US" altLang="zh-TW" dirty="0"/>
+              <a:t>Simple Hybrid model(add) Test Score: 1.29 RMSE</a:t>
+            </a:r>
+          </a:p>
+          <a:p>
+            <a:endParaRPr lang="en-US" altLang="zh-TW" dirty="0"/>
+          </a:p>
+          <a:p>
+            <a:r>
+              <a:rPr lang="en-US" altLang="zh-TW" dirty="0"/>
+              <a:t>Hybrid model Test Score: 0.51 MAE</a:t>
+            </a:r>
+          </a:p>
+          <a:p>
+            <a:r>
+              <a:rPr lang="en-US" altLang="zh-TW" dirty="0"/>
+              <a:t>Hybrid model Test Score: 0.68 RMSE</a:t>
+            </a:r>
+            <a:endParaRPr lang="zh-TW" altLang="en-US" dirty="0"/>
+          </a:p>
+        </p:txBody>
+      </p:sp>
+    </p:spTree>
+    <p:extLst>
+      <p:ext uri="{BB962C8B-B14F-4D97-AF65-F5344CB8AC3E}">
+        <p14:creationId xmlns:p14="http://schemas.microsoft.com/office/powerpoint/2010/main" val="1834530439"/>
+      </p:ext>
+    </p:extLst>
+  </p:cSld>
+  <p:clrMapOvr>
+    <a:masterClrMapping/>
+  </p:clrMapOvr>
+</p:sld>
+</file>
+
 <file path=ppt/slides/slide3.xml><?xml version="1.0" encoding="utf-8"?>
+<p:sld xmlns:a="http://schemas.openxmlformats.org/drawingml/2006/main" xmlns:r="http://schemas.openxmlformats.org/officeDocument/2006/relationships" xmlns:p="http://schemas.openxmlformats.org/presentationml/2006/main">
+  <p:cSld>
+    <p:spTree>
+      <p:nvGrpSpPr>
+        <p:cNvPr id="1" name=""/>
+        <p:cNvGrpSpPr/>
+        <p:nvPr/>
+      </p:nvGrpSpPr>
+      <p:grpSpPr>
+        <a:xfrm>
+          <a:off x="0" y="0"/>
+          <a:ext cx="0" cy="0"/>
+          <a:chOff x="0" y="0"/>
+          <a:chExt cx="0" cy="0"/>
+        </a:xfrm>
+      </p:grpSpPr>
+      <p:sp>
+        <p:nvSpPr>
+          <p:cNvPr id="2" name="標題 1">
+            <a:extLst>
+              <a:ext uri="{FF2B5EF4-FFF2-40B4-BE49-F238E27FC236}">
+                <a16:creationId xmlns:a16="http://schemas.microsoft.com/office/drawing/2014/main" id="{4B1EC075-4FAC-4D28-822A-71351B8E2413}"/>
+              </a:ext>
+            </a:extLst>
+          </p:cNvPr>
+          <p:cNvSpPr>
+            <a:spLocks noGrp="1"/>
+          </p:cNvSpPr>
+          <p:nvPr>
+            <p:ph type="title"/>
+          </p:nvPr>
+        </p:nvSpPr>
+        <p:spPr/>
+        <p:txBody>
+          <a:bodyPr/>
+          <a:lstStyle/>
+          <a:p>
+            <a:r>
+              <a:rPr lang="en-US" altLang="zh-TW" dirty="0"/>
+              <a:t>Attribute Information</a:t>
+            </a:r>
+            <a:endParaRPr lang="zh-TW" altLang="en-US" dirty="0"/>
+          </a:p>
+        </p:txBody>
+      </p:sp>
+      <p:sp>
+        <p:nvSpPr>
+          <p:cNvPr id="3" name="內容版面配置區 2">
+            <a:extLst>
+              <a:ext uri="{FF2B5EF4-FFF2-40B4-BE49-F238E27FC236}">
+                <a16:creationId xmlns:a16="http://schemas.microsoft.com/office/drawing/2014/main" id="{A45493F7-1EA6-427E-BA3E-4F88A19D3AFA}"/>
+              </a:ext>
+            </a:extLst>
+          </p:cNvPr>
+          <p:cNvSpPr>
+            <a:spLocks noGrp="1"/>
+          </p:cNvSpPr>
+          <p:nvPr>
+            <p:ph idx="1"/>
+          </p:nvPr>
+        </p:nvSpPr>
+        <p:spPr>
+          <a:xfrm>
+            <a:off x="195943" y="1058090"/>
+            <a:ext cx="11743508" cy="5799909"/>
+          </a:xfrm>
+        </p:spPr>
+        <p:txBody>
+          <a:bodyPr>
+            <a:noAutofit/>
+          </a:bodyPr>
+          <a:lstStyle/>
+          <a:p>
+            <a:pPr marL="0" indent="0">
+              <a:buNone/>
+            </a:pPr>
+            <a:r>
+              <a:rPr lang="en-US" altLang="zh-TW" sz="2000" dirty="0"/>
+              <a:t>3.global_active_power: household global minute-averaged active power (in kilowatt)</a:t>
+            </a:r>
+          </a:p>
+          <a:p>
+            <a:pPr marL="0" indent="0">
+              <a:buNone/>
+            </a:pPr>
+            <a:r>
+              <a:rPr lang="en-US" altLang="zh-TW" sz="2000" dirty="0"/>
+              <a:t>4.global_reactive_power: household global minute-averaged reactive power (in kilowatt)</a:t>
+            </a:r>
+          </a:p>
+          <a:p>
+            <a:pPr marL="0" indent="0">
+              <a:buNone/>
+            </a:pPr>
+            <a:r>
+              <a:rPr lang="en-US" altLang="zh-TW" sz="2000" dirty="0"/>
+              <a:t>5.voltage: minute-averaged voltage (in volt)</a:t>
+            </a:r>
+          </a:p>
+          <a:p>
+            <a:pPr marL="0" indent="0">
+              <a:buNone/>
+            </a:pPr>
+            <a:r>
+              <a:rPr lang="en-US" altLang="zh-TW" sz="2000" dirty="0"/>
+              <a:t>6.global_intensity: household global minute-averaged current intensity (in ampere)</a:t>
+            </a:r>
+          </a:p>
+          <a:p>
+            <a:pPr marL="0" indent="0">
+              <a:buNone/>
+            </a:pPr>
+            <a:r>
+              <a:rPr lang="en-US" altLang="zh-TW" sz="2000" dirty="0"/>
+              <a:t>7.sub_metering_1: energy sub-metering No. 1 (in watt-hour of active energy). It corresponds to the kitchen, containing mainly a dishwasher, an oven and a microwave (hot plates are not electric but gas powered).</a:t>
+            </a:r>
+          </a:p>
+          <a:p>
+            <a:pPr marL="0" indent="0">
+              <a:buNone/>
+            </a:pPr>
+            <a:r>
+              <a:rPr lang="en-US" altLang="zh-TW" sz="2000" dirty="0"/>
+              <a:t>8.sub_metering_2: energy sub-metering No. 2 (in watt-hour of active energy). It corresponds to the laundry room, containing a washing-machine, a tumble-drier, a refrigerator and a light.</a:t>
+            </a:r>
+          </a:p>
+          <a:p>
+            <a:pPr marL="0" indent="0">
+              <a:buNone/>
+            </a:pPr>
+            <a:r>
+              <a:rPr lang="en-US" altLang="zh-TW" sz="2000" dirty="0"/>
+              <a:t>9.sub_metering_3: energy sub-metering No. 3 (in watt-hour of active energy). It corresponds to an electric water-heater and an air-conditioner.</a:t>
+            </a:r>
+          </a:p>
+          <a:p>
+            <a:pPr marL="0" indent="0">
+              <a:buNone/>
+            </a:pPr>
+            <a:r>
+              <a:rPr lang="en-US" altLang="zh-TW" sz="2000" dirty="0"/>
+              <a:t>10.sub_metering_3: energy sub-metering No. 4 (in watt-hour of active energy). It corresponds to an electric water-heater and an air-conditioner.</a:t>
+            </a:r>
+          </a:p>
+        </p:txBody>
+      </p:sp>
+    </p:spTree>
+    <p:extLst>
+      <p:ext uri="{BB962C8B-B14F-4D97-AF65-F5344CB8AC3E}">
+        <p14:creationId xmlns:p14="http://schemas.microsoft.com/office/powerpoint/2010/main" val="1959302668"/>
+      </p:ext>
+    </p:extLst>
+  </p:cSld>
+  <p:clrMapOvr>
+    <a:masterClrMapping/>
+  </p:clrMapOvr>
+</p:sld>
+</file>
+
+<file path=ppt/slides/slide4.xml><?xml version="1.0" encoding="utf-8"?>
+<p:sld xmlns:a="http://schemas.openxmlformats.org/drawingml/2006/main" xmlns:r="http://schemas.openxmlformats.org/officeDocument/2006/relationships" xmlns:p="http://schemas.openxmlformats.org/presentationml/2006/main">
+  <p:cSld>
+    <p:spTree>
+      <p:nvGrpSpPr>
+        <p:cNvPr id="1" name=""/>
+        <p:cNvGrpSpPr/>
+        <p:nvPr/>
+      </p:nvGrpSpPr>
+      <p:grpSpPr>
+        <a:xfrm>
+          <a:off x="0" y="0"/>
+          <a:ext cx="0" cy="0"/>
+          <a:chOff x="0" y="0"/>
+          <a:chExt cx="0" cy="0"/>
+        </a:xfrm>
+      </p:grpSpPr>
+      <p:sp>
+        <p:nvSpPr>
+          <p:cNvPr id="2" name="標題 1">
+            <a:extLst>
+              <a:ext uri="{FF2B5EF4-FFF2-40B4-BE49-F238E27FC236}">
+                <a16:creationId xmlns:a16="http://schemas.microsoft.com/office/drawing/2014/main" id="{16A8AEBC-7D44-4DAF-BC89-535A74BFE2CA}"/>
+              </a:ext>
+            </a:extLst>
+          </p:cNvPr>
+          <p:cNvSpPr>
+            <a:spLocks noGrp="1"/>
+          </p:cNvSpPr>
+          <p:nvPr>
+            <p:ph type="title"/>
+          </p:nvPr>
+        </p:nvSpPr>
+        <p:spPr/>
+        <p:txBody>
+          <a:bodyPr/>
+          <a:lstStyle/>
+          <a:p>
+            <a:r>
+              <a:rPr lang="en-US" altLang="zh-TW" dirty="0"/>
+              <a:t>Correlation</a:t>
+            </a:r>
+            <a:endParaRPr lang="zh-TW" altLang="en-US" dirty="0"/>
+          </a:p>
+        </p:txBody>
+      </p:sp>
+      <p:sp>
+        <p:nvSpPr>
+          <p:cNvPr id="3" name="內容版面配置區 2">
+            <a:extLst>
+              <a:ext uri="{FF2B5EF4-FFF2-40B4-BE49-F238E27FC236}">
+                <a16:creationId xmlns:a16="http://schemas.microsoft.com/office/drawing/2014/main" id="{5D7EF283-52AF-48C7-AB5B-1D4825A092FB}"/>
+              </a:ext>
+            </a:extLst>
+          </p:cNvPr>
+          <p:cNvSpPr>
+            <a:spLocks noGrp="1"/>
+          </p:cNvSpPr>
+          <p:nvPr>
+            <p:ph idx="1"/>
+          </p:nvPr>
+        </p:nvSpPr>
+        <p:spPr/>
+        <p:txBody>
+          <a:bodyPr/>
+          <a:lstStyle/>
+          <a:p>
+            <a:endParaRPr lang="zh-TW" altLang="en-US" dirty="0"/>
+          </a:p>
+        </p:txBody>
+      </p:sp>
+      <p:pic>
+        <p:nvPicPr>
+          <p:cNvPr id="4098" name="Picture 2">
+            <a:extLst>
+              <a:ext uri="{FF2B5EF4-FFF2-40B4-BE49-F238E27FC236}">
+                <a16:creationId xmlns:a16="http://schemas.microsoft.com/office/drawing/2014/main" id="{7D43A1BC-8FF6-49E1-934F-B2AF743DB108}"/>
+              </a:ext>
+            </a:extLst>
+          </p:cNvPr>
+          <p:cNvPicPr>
+            <a:picLocks noChangeAspect="1" noChangeArrowheads="1"/>
+          </p:cNvPicPr>
+          <p:nvPr/>
+        </p:nvPicPr>
+        <p:blipFill>
+          <a:blip r:embed="rId2">
+            <a:extLst>
+              <a:ext uri="{28A0092B-C50C-407E-A947-70E740481C1C}">
+                <a14:useLocalDpi xmlns:a14="http://schemas.microsoft.com/office/drawing/2010/main" val="0"/>
+              </a:ext>
+            </a:extLst>
+          </a:blip>
+          <a:srcRect/>
+          <a:stretch>
+            <a:fillRect/>
+          </a:stretch>
+        </p:blipFill>
+        <p:spPr bwMode="auto">
+          <a:xfrm>
+            <a:off x="2914284" y="1058091"/>
+            <a:ext cx="5508681" cy="5469050"/>
+          </a:xfrm>
+          <a:prstGeom prst="rect">
+            <a:avLst/>
+          </a:prstGeom>
+          <a:noFill/>
+          <a:extLst>
+            <a:ext uri="{909E8E84-426E-40DD-AFC4-6F175D3DCCD1}">
+              <a14:hiddenFill xmlns:a14="http://schemas.microsoft.com/office/drawing/2010/main">
+                <a:solidFill>
+                  <a:srgbClr val="FFFFFF"/>
+                </a:solidFill>
+              </a14:hiddenFill>
+            </a:ext>
+          </a:extLst>
+        </p:spPr>
+      </p:pic>
+    </p:spTree>
+    <p:extLst>
+      <p:ext uri="{BB962C8B-B14F-4D97-AF65-F5344CB8AC3E}">
+        <p14:creationId xmlns:p14="http://schemas.microsoft.com/office/powerpoint/2010/main" val="2413721183"/>
+      </p:ext>
+    </p:extLst>
+  </p:cSld>
+  <p:clrMapOvr>
+    <a:masterClrMapping/>
+  </p:clrMapOvr>
+</p:sld>
+</file>
+
+<file path=ppt/slides/slide5.xml><?xml version="1.0" encoding="utf-8"?>
 <p:sld xmlns:a="http://schemas.openxmlformats.org/drawingml/2006/main" xmlns:r="http://schemas.openxmlformats.org/officeDocument/2006/relationships" xmlns:p="http://schemas.openxmlformats.org/presentationml/2006/main">
   <p:cSld>
     <p:spTree>
@@ -3729,7 +6038,7 @@
 </p:sld>
 </file>
 
-<file path=ppt/slides/slide4.xml><?xml version="1.0" encoding="utf-8"?>
+<file path=ppt/slides/slide6.xml><?xml version="1.0" encoding="utf-8"?>
 <p:sld xmlns:a="http://schemas.openxmlformats.org/drawingml/2006/main" xmlns:r="http://schemas.openxmlformats.org/officeDocument/2006/relationships" xmlns:p="http://schemas.openxmlformats.org/presentationml/2006/main">
   <p:cSld>
     <p:spTree>
@@ -3832,8 +6141,8 @@
           </a:prstGeom>
         </p:spPr>
       </p:pic>
-      <mc:AlternateContent xmlns:mc="http://schemas.openxmlformats.org/markup-compatibility/2006">
-        <mc:Choice xmlns:a14="http://schemas.microsoft.com/office/drawing/2010/main" Requires="a14">
+      <mc:AlternateContent xmlns:mc="http://schemas.openxmlformats.org/markup-compatibility/2006" xmlns:a14="http://schemas.microsoft.com/office/drawing/2010/main">
+        <mc:Choice Requires="a14">
           <p:sp>
             <p:nvSpPr>
               <p:cNvPr id="5" name="文字方塊 4">
@@ -3862,7 +6171,6 @@
               </a:bodyPr>
               <a:lstStyle/>
               <a:p>
-                <a:pPr/>
                 <a14:m>
                   <m:oMath xmlns:m="http://schemas.openxmlformats.org/officeDocument/2006/math">
                     <m:sSub>
@@ -3902,7 +6210,6 @@
                 </a:r>
               </a:p>
               <a:p>
-                <a:pPr/>
                 <a14:m>
                   <m:oMath xmlns:m="http://schemas.openxmlformats.org/officeDocument/2006/math">
                     <m:sSub>
@@ -3942,7 +6249,6 @@
                 </a:r>
               </a:p>
               <a:p>
-                <a:pPr/>
                 <a:r>
                   <a:rPr lang="en-US" altLang="zh-TW" sz="2400" dirty="0" err="1"/>
                   <a:t>LSTM</a:t>
@@ -3961,7 +6267,6 @@
                 </a:r>
               </a:p>
               <a:p>
-                <a:pPr/>
                 <a:r>
                   <a:rPr lang="en-US" altLang="zh-TW" sz="2400" dirty="0" err="1"/>
                   <a:t>LSTM</a:t>
@@ -3980,7 +6285,6 @@
                 </a:r>
               </a:p>
               <a:p>
-                <a:pPr/>
                 <a:r>
                   <a:rPr lang="en-US" altLang="zh-TW" sz="2400" dirty="0"/>
                   <a:t>Concatenate : </a:t>
@@ -4067,7 +6371,7 @@
             </p:txBody>
           </p:sp>
         </mc:Choice>
-        <mc:Fallback>
+        <mc:Fallback xmlns="">
           <p:sp>
             <p:nvSpPr>
               <p:cNvPr id="5" name="文字方塊 4">
@@ -4125,7 +6429,7 @@
 </p:sld>
 </file>
 
-<file path=ppt/slides/slide5.xml><?xml version="1.0" encoding="utf-8"?>
+<file path=ppt/slides/slide7.xml><?xml version="1.0" encoding="utf-8"?>
 <p:sld xmlns:a="http://schemas.openxmlformats.org/drawingml/2006/main" xmlns:r="http://schemas.openxmlformats.org/officeDocument/2006/relationships" xmlns:p="http://schemas.openxmlformats.org/presentationml/2006/main">
   <p:cSld>
     <p:spTree>
@@ -4256,7 +6560,7 @@
 </p:sld>
 </file>
 
-<file path=ppt/slides/slide6.xml><?xml version="1.0" encoding="utf-8"?>
+<file path=ppt/slides/slide8.xml><?xml version="1.0" encoding="utf-8"?>
 <p:sld xmlns:a="http://schemas.openxmlformats.org/drawingml/2006/main" xmlns:r="http://schemas.openxmlformats.org/officeDocument/2006/relationships" xmlns:p="http://schemas.openxmlformats.org/presentationml/2006/main">
   <p:cSld>
     <p:spTree>
@@ -4387,7 +6691,7 @@
 </p:sld>
 </file>
 
-<file path=ppt/slides/slide7.xml><?xml version="1.0" encoding="utf-8"?>
+<file path=ppt/slides/slide9.xml><?xml version="1.0" encoding="utf-8"?>
 <p:sld xmlns:a="http://schemas.openxmlformats.org/drawingml/2006/main" xmlns:r="http://schemas.openxmlformats.org/officeDocument/2006/relationships" xmlns:p="http://schemas.openxmlformats.org/presentationml/2006/main">
   <p:cSld>
     <p:spTree>

</xml_diff>